<commit_message>
change coordinate systems location
</commit_message>
<xml_diff>
--- a/documentation/geometryBaseTypes.pptx
+++ b/documentation/geometryBaseTypes.pptx
@@ -104,6 +104,11 @@
       </a:defRPr>
     </a:lvl9pPr>
   </p:defaultTextStyle>
+  <p:extLst>
+    <p:ext uri="{EFAFB233-063F-42B5-8137-9DF3F51BA10A}">
+      <p15:sldGuideLst xmlns:p15="http://schemas.microsoft.com/office/powerpoint/2012/main"/>
+    </p:ext>
+  </p:extLst>
 </p:presentation>
 </file>
 
@@ -254,7 +259,7 @@
           <a:p>
             <a:fld id="{715DB31A-0B2B-4E58-B8E4-5EFF1931F507}" type="datetimeFigureOut">
               <a:rPr lang="de-DE" smtClean="0"/>
-              <a:t>13.11.2023</a:t>
+              <a:t>16.11.2023</a:t>
             </a:fld>
             <a:endParaRPr lang="de-DE"/>
           </a:p>
@@ -452,7 +457,7 @@
           <a:p>
             <a:fld id="{715DB31A-0B2B-4E58-B8E4-5EFF1931F507}" type="datetimeFigureOut">
               <a:rPr lang="de-DE" smtClean="0"/>
-              <a:t>13.11.2023</a:t>
+              <a:t>16.11.2023</a:t>
             </a:fld>
             <a:endParaRPr lang="de-DE"/>
           </a:p>
@@ -660,7 +665,7 @@
           <a:p>
             <a:fld id="{715DB31A-0B2B-4E58-B8E4-5EFF1931F507}" type="datetimeFigureOut">
               <a:rPr lang="de-DE" smtClean="0"/>
-              <a:t>13.11.2023</a:t>
+              <a:t>16.11.2023</a:t>
             </a:fld>
             <a:endParaRPr lang="de-DE"/>
           </a:p>
@@ -858,7 +863,7 @@
           <a:p>
             <a:fld id="{715DB31A-0B2B-4E58-B8E4-5EFF1931F507}" type="datetimeFigureOut">
               <a:rPr lang="de-DE" smtClean="0"/>
-              <a:t>13.11.2023</a:t>
+              <a:t>16.11.2023</a:t>
             </a:fld>
             <a:endParaRPr lang="de-DE"/>
           </a:p>
@@ -1133,7 +1138,7 @@
           <a:p>
             <a:fld id="{715DB31A-0B2B-4E58-B8E4-5EFF1931F507}" type="datetimeFigureOut">
               <a:rPr lang="de-DE" smtClean="0"/>
-              <a:t>13.11.2023</a:t>
+              <a:t>16.11.2023</a:t>
             </a:fld>
             <a:endParaRPr lang="de-DE"/>
           </a:p>
@@ -1398,7 +1403,7 @@
           <a:p>
             <a:fld id="{715DB31A-0B2B-4E58-B8E4-5EFF1931F507}" type="datetimeFigureOut">
               <a:rPr lang="de-DE" smtClean="0"/>
-              <a:t>13.11.2023</a:t>
+              <a:t>16.11.2023</a:t>
             </a:fld>
             <a:endParaRPr lang="de-DE"/>
           </a:p>
@@ -1810,7 +1815,7 @@
           <a:p>
             <a:fld id="{715DB31A-0B2B-4E58-B8E4-5EFF1931F507}" type="datetimeFigureOut">
               <a:rPr lang="de-DE" smtClean="0"/>
-              <a:t>13.11.2023</a:t>
+              <a:t>16.11.2023</a:t>
             </a:fld>
             <a:endParaRPr lang="de-DE"/>
           </a:p>
@@ -1951,7 +1956,7 @@
           <a:p>
             <a:fld id="{715DB31A-0B2B-4E58-B8E4-5EFF1931F507}" type="datetimeFigureOut">
               <a:rPr lang="de-DE" smtClean="0"/>
-              <a:t>13.11.2023</a:t>
+              <a:t>16.11.2023</a:t>
             </a:fld>
             <a:endParaRPr lang="de-DE"/>
           </a:p>
@@ -2064,7 +2069,7 @@
           <a:p>
             <a:fld id="{715DB31A-0B2B-4E58-B8E4-5EFF1931F507}" type="datetimeFigureOut">
               <a:rPr lang="de-DE" smtClean="0"/>
-              <a:t>13.11.2023</a:t>
+              <a:t>16.11.2023</a:t>
             </a:fld>
             <a:endParaRPr lang="de-DE"/>
           </a:p>
@@ -2375,7 +2380,7 @@
           <a:p>
             <a:fld id="{715DB31A-0B2B-4E58-B8E4-5EFF1931F507}" type="datetimeFigureOut">
               <a:rPr lang="de-DE" smtClean="0"/>
-              <a:t>13.11.2023</a:t>
+              <a:t>16.11.2023</a:t>
             </a:fld>
             <a:endParaRPr lang="de-DE"/>
           </a:p>
@@ -2663,7 +2668,7 @@
           <a:p>
             <a:fld id="{715DB31A-0B2B-4E58-B8E4-5EFF1931F507}" type="datetimeFigureOut">
               <a:rPr lang="de-DE" smtClean="0"/>
-              <a:t>13.11.2023</a:t>
+              <a:t>16.11.2023</a:t>
             </a:fld>
             <a:endParaRPr lang="de-DE"/>
           </a:p>
@@ -2904,7 +2909,7 @@
           <a:p>
             <a:fld id="{715DB31A-0B2B-4E58-B8E4-5EFF1931F507}" type="datetimeFigureOut">
               <a:rPr lang="de-DE" smtClean="0"/>
-              <a:t>13.11.2023</a:t>
+              <a:t>16.11.2023</a:t>
             </a:fld>
             <a:endParaRPr lang="de-DE"/>
           </a:p>
@@ -3323,6 +3328,79 @@
       </p:grpSpPr>
       <p:sp>
         <p:nvSpPr>
+          <p:cNvPr id="62" name="Rechteck 61">
+            <a:extLst>
+              <a:ext uri="{FF2B5EF4-FFF2-40B4-BE49-F238E27FC236}">
+                <a16:creationId xmlns:a16="http://schemas.microsoft.com/office/drawing/2014/main" id="{9171F754-32E7-46D7-9D86-0055169C8B1C}"/>
+              </a:ext>
+            </a:extLst>
+          </p:cNvPr>
+          <p:cNvSpPr/>
+          <p:nvPr/>
+        </p:nvSpPr>
+        <p:spPr>
+          <a:xfrm>
+            <a:off x="1039186" y="2667000"/>
+            <a:ext cx="1308100" cy="762000"/>
+          </a:xfrm>
+          <a:prstGeom prst="rect">
+            <a:avLst/>
+          </a:prstGeom>
+          <a:solidFill>
+            <a:srgbClr val="8FAADC">
+              <a:alpha val="85098"/>
+            </a:srgbClr>
+          </a:solidFill>
+          <a:ln>
+            <a:noFill/>
+          </a:ln>
+          <a:effectLst>
+            <a:outerShdw blurRad="508000" sx="121000" sy="121000" algn="ctr" rotWithShape="0">
+              <a:prstClr val="black">
+                <a:alpha val="40000"/>
+              </a:prstClr>
+            </a:outerShdw>
+          </a:effectLst>
+          <a:scene3d>
+            <a:camera prst="isometricOffAxis1Top"/>
+            <a:lightRig rig="threePt" dir="t"/>
+          </a:scene3d>
+          <a:sp3d>
+            <a:bevelT w="0" h="552450"/>
+          </a:sp3d>
+        </p:spPr>
+        <p:style>
+          <a:lnRef idx="2">
+            <a:schemeClr val="accent1">
+              <a:shade val="50000"/>
+            </a:schemeClr>
+          </a:lnRef>
+          <a:fillRef idx="1">
+            <a:schemeClr val="accent1"/>
+          </a:fillRef>
+          <a:effectRef idx="0">
+            <a:schemeClr val="accent1"/>
+          </a:effectRef>
+          <a:fontRef idx="minor">
+            <a:schemeClr val="lt1"/>
+          </a:fontRef>
+        </p:style>
+        <p:txBody>
+          <a:bodyPr rot="0" spcFirstLastPara="0" vertOverflow="overflow" horzOverflow="overflow" vert="horz" wrap="square" lIns="91440" tIns="45720" rIns="91440" bIns="45720" numCol="1" spcCol="0" rtlCol="0" fromWordArt="0" anchor="ctr" anchorCtr="0" forceAA="0" compatLnSpc="1">
+            <a:prstTxWarp prst="textNoShape">
+              <a:avLst/>
+            </a:prstTxWarp>
+            <a:noAutofit/>
+          </a:bodyPr>
+          <a:lstStyle/>
+          <a:p>
+            <a:pPr algn="ctr"/>
+            <a:endParaRPr lang="de-DE" dirty="0"/>
+          </a:p>
+        </p:txBody>
+      </p:sp>
+      <p:sp>
+        <p:nvSpPr>
           <p:cNvPr id="10" name="Ellipse 9">
             <a:extLst>
               <a:ext uri="{FF2B5EF4-FFF2-40B4-BE49-F238E27FC236}">
@@ -3463,85 +3541,12 @@
           </a:p>
         </p:txBody>
       </p:sp>
-      <p:sp>
-        <p:nvSpPr>
-          <p:cNvPr id="9" name="Rechteck 8">
-            <a:extLst>
-              <a:ext uri="{FF2B5EF4-FFF2-40B4-BE49-F238E27FC236}">
-                <a16:creationId xmlns:a16="http://schemas.microsoft.com/office/drawing/2014/main" id="{2A04C55F-0FEE-41DA-BA25-261A85BD7714}"/>
-              </a:ext>
-            </a:extLst>
-          </p:cNvPr>
-          <p:cNvSpPr/>
-          <p:nvPr/>
-        </p:nvSpPr>
-        <p:spPr>
-          <a:xfrm>
-            <a:off x="1039186" y="2663870"/>
-            <a:ext cx="1308100" cy="762000"/>
-          </a:xfrm>
-          <a:prstGeom prst="rect">
-            <a:avLst/>
-          </a:prstGeom>
-          <a:solidFill>
-            <a:srgbClr val="8FAADC">
-              <a:alpha val="85098"/>
-            </a:srgbClr>
-          </a:solidFill>
-          <a:ln>
-            <a:noFill/>
-          </a:ln>
-          <a:effectLst>
-            <a:outerShdw blurRad="508000" sx="121000" sy="121000" algn="ctr" rotWithShape="0">
-              <a:prstClr val="black">
-                <a:alpha val="40000"/>
-              </a:prstClr>
-            </a:outerShdw>
-          </a:effectLst>
-          <a:scene3d>
-            <a:camera prst="isometricOffAxis1Top"/>
-            <a:lightRig rig="threePt" dir="t"/>
-          </a:scene3d>
-          <a:sp3d>
-            <a:bevelT w="0" h="552450"/>
-          </a:sp3d>
-        </p:spPr>
-        <p:style>
-          <a:lnRef idx="2">
-            <a:schemeClr val="accent1">
-              <a:shade val="50000"/>
-            </a:schemeClr>
-          </a:lnRef>
-          <a:fillRef idx="1">
-            <a:schemeClr val="accent1"/>
-          </a:fillRef>
-          <a:effectRef idx="0">
-            <a:schemeClr val="accent1"/>
-          </a:effectRef>
-          <a:fontRef idx="minor">
-            <a:schemeClr val="lt1"/>
-          </a:fontRef>
-        </p:style>
-        <p:txBody>
-          <a:bodyPr rot="0" spcFirstLastPara="0" vertOverflow="overflow" horzOverflow="overflow" vert="horz" wrap="square" lIns="91440" tIns="45720" rIns="91440" bIns="45720" numCol="1" spcCol="0" rtlCol="0" fromWordArt="0" anchor="ctr" anchorCtr="0" forceAA="0" compatLnSpc="1">
-            <a:prstTxWarp prst="textNoShape">
-              <a:avLst/>
-            </a:prstTxWarp>
-            <a:noAutofit/>
-          </a:bodyPr>
-          <a:lstStyle/>
-          <a:p>
-            <a:pPr algn="ctr"/>
-            <a:endParaRPr lang="de-DE" dirty="0"/>
-          </a:p>
-        </p:txBody>
-      </p:sp>
       <p:cxnSp>
         <p:nvCxnSpPr>
-          <p:cNvPr id="12" name="Gerade Verbindung mit Pfeil 11">
-            <a:extLst>
-              <a:ext uri="{FF2B5EF4-FFF2-40B4-BE49-F238E27FC236}">
-                <a16:creationId xmlns:a16="http://schemas.microsoft.com/office/drawing/2014/main" id="{EDE78D3D-4F93-483B-A1C3-E403633D72EC}"/>
+          <p:cNvPr id="33" name="Gerade Verbindung mit Pfeil 32">
+            <a:extLst>
+              <a:ext uri="{FF2B5EF4-FFF2-40B4-BE49-F238E27FC236}">
+                <a16:creationId xmlns:a16="http://schemas.microsoft.com/office/drawing/2014/main" id="{A06EC633-79A1-46A1-B241-8A7D3CCB480C}"/>
               </a:ext>
             </a:extLst>
           </p:cNvPr>
@@ -3552,502 +3557,7 @@
         </p:nvCxnSpPr>
         <p:spPr>
           <a:xfrm flipV="1">
-            <a:off x="1268027" y="3705270"/>
-            <a:ext cx="417563" cy="60325"/>
-          </a:xfrm>
-          <a:prstGeom prst="straightConnector1">
-            <a:avLst/>
-          </a:prstGeom>
-          <a:ln w="12700">
-            <a:solidFill>
-              <a:schemeClr val="tx1">
-                <a:lumMod val="85000"/>
-                <a:lumOff val="15000"/>
-              </a:schemeClr>
-            </a:solidFill>
-            <a:tailEnd type="triangle" w="sm" len="lg"/>
-          </a:ln>
-        </p:spPr>
-        <p:style>
-          <a:lnRef idx="1">
-            <a:schemeClr val="accent1"/>
-          </a:lnRef>
-          <a:fillRef idx="0">
-            <a:schemeClr val="accent1"/>
-          </a:fillRef>
-          <a:effectRef idx="0">
-            <a:schemeClr val="accent1"/>
-          </a:effectRef>
-          <a:fontRef idx="minor">
-            <a:schemeClr val="tx1"/>
-          </a:fontRef>
-        </p:style>
-      </p:cxnSp>
-      <p:cxnSp>
-        <p:nvCxnSpPr>
-          <p:cNvPr id="13" name="Gerade Verbindung mit Pfeil 12">
-            <a:extLst>
-              <a:ext uri="{FF2B5EF4-FFF2-40B4-BE49-F238E27FC236}">
-                <a16:creationId xmlns:a16="http://schemas.microsoft.com/office/drawing/2014/main" id="{A935FC01-3AFB-47EB-AD77-A9FB9543F898}"/>
-              </a:ext>
-            </a:extLst>
-          </p:cNvPr>
-          <p:cNvCxnSpPr>
-            <a:cxnSpLocks/>
-          </p:cNvCxnSpPr>
-          <p:nvPr/>
-        </p:nvCxnSpPr>
-        <p:spPr>
-          <a:xfrm flipV="1">
-            <a:off x="1268027" y="3292520"/>
-            <a:ext cx="0" cy="473075"/>
-          </a:xfrm>
-          <a:prstGeom prst="straightConnector1">
-            <a:avLst/>
-          </a:prstGeom>
-          <a:ln w="12700">
-            <a:solidFill>
-              <a:schemeClr val="tx1">
-                <a:lumMod val="85000"/>
-                <a:lumOff val="15000"/>
-              </a:schemeClr>
-            </a:solidFill>
-            <a:tailEnd type="triangle" w="sm" len="lg"/>
-          </a:ln>
-        </p:spPr>
-        <p:style>
-          <a:lnRef idx="1">
-            <a:schemeClr val="accent1"/>
-          </a:lnRef>
-          <a:fillRef idx="0">
-            <a:schemeClr val="accent1"/>
-          </a:fillRef>
-          <a:effectRef idx="0">
-            <a:schemeClr val="accent1"/>
-          </a:effectRef>
-          <a:fontRef idx="minor">
-            <a:schemeClr val="tx1"/>
-          </a:fontRef>
-        </p:style>
-      </p:cxnSp>
-      <p:cxnSp>
-        <p:nvCxnSpPr>
-          <p:cNvPr id="16" name="Gerade Verbindung mit Pfeil 15">
-            <a:extLst>
-              <a:ext uri="{FF2B5EF4-FFF2-40B4-BE49-F238E27FC236}">
-                <a16:creationId xmlns:a16="http://schemas.microsoft.com/office/drawing/2014/main" id="{0191FBAA-606F-4F3A-A142-ED3B6FAD3C65}"/>
-              </a:ext>
-            </a:extLst>
-          </p:cNvPr>
-          <p:cNvCxnSpPr>
-            <a:cxnSpLocks/>
-          </p:cNvCxnSpPr>
-          <p:nvPr/>
-        </p:nvCxnSpPr>
-        <p:spPr>
-          <a:xfrm flipH="1" flipV="1">
-            <a:off x="972751" y="3575095"/>
-            <a:ext cx="295275" cy="190500"/>
-          </a:xfrm>
-          <a:prstGeom prst="straightConnector1">
-            <a:avLst/>
-          </a:prstGeom>
-          <a:ln w="12700">
-            <a:solidFill>
-              <a:schemeClr val="tx1">
-                <a:lumMod val="85000"/>
-                <a:lumOff val="15000"/>
-              </a:schemeClr>
-            </a:solidFill>
-            <a:tailEnd type="triangle" w="sm" len="lg"/>
-          </a:ln>
-        </p:spPr>
-        <p:style>
-          <a:lnRef idx="1">
-            <a:schemeClr val="accent1"/>
-          </a:lnRef>
-          <a:fillRef idx="0">
-            <a:schemeClr val="accent1"/>
-          </a:fillRef>
-          <a:effectRef idx="0">
-            <a:schemeClr val="accent1"/>
-          </a:effectRef>
-          <a:fontRef idx="minor">
-            <a:schemeClr val="tx1"/>
-          </a:fontRef>
-        </p:style>
-      </p:cxnSp>
-      <mc:AlternateContent xmlns:mc="http://schemas.openxmlformats.org/markup-compatibility/2006">
-        <mc:Choice xmlns:a14="http://schemas.microsoft.com/office/drawing/2010/main" Requires="a14">
-          <p:sp>
-            <p:nvSpPr>
-              <p:cNvPr id="20" name="Textfeld 19">
-                <a:extLst>
-                  <a:ext uri="{FF2B5EF4-FFF2-40B4-BE49-F238E27FC236}">
-                    <a16:creationId xmlns:a16="http://schemas.microsoft.com/office/drawing/2014/main" id="{2802209C-1AD8-4823-B27E-CFFAD01F1DDF}"/>
-                  </a:ext>
-                </a:extLst>
-              </p:cNvPr>
-              <p:cNvSpPr txBox="1"/>
-              <p:nvPr/>
-            </p:nvSpPr>
-            <p:spPr>
-              <a:xfrm>
-                <a:off x="730690" y="3566770"/>
-                <a:ext cx="333369" cy="153888"/>
-              </a:xfrm>
-              <a:prstGeom prst="rect">
-                <a:avLst/>
-              </a:prstGeom>
-              <a:noFill/>
-            </p:spPr>
-            <p:txBody>
-              <a:bodyPr wrap="square" lIns="0" tIns="0" rIns="0" bIns="0" rtlCol="0">
-                <a:spAutoFit/>
-              </a:bodyPr>
-              <a:lstStyle/>
-              <a:p>
-                <a14:m>
-                  <m:oMathPara xmlns:m="http://schemas.openxmlformats.org/officeDocument/2006/math">
-                    <m:oMathParaPr>
-                      <m:jc m:val="centerGroup"/>
-                    </m:oMathParaPr>
-                    <m:oMath xmlns:m="http://schemas.openxmlformats.org/officeDocument/2006/math">
-                      <m:r>
-                        <a:rPr lang="de-DE" sz="1000" b="0" i="1" dirty="0" smtClean="0">
-                          <a:latin typeface="Cambria Math" panose="02040503050406030204" pitchFamily="18" charset="0"/>
-                        </a:rPr>
-                        <m:t>𝑦</m:t>
-                      </m:r>
-                    </m:oMath>
-                  </m:oMathPara>
-                </a14:m>
-                <a:endParaRPr lang="de-DE" sz="1000" dirty="0"/>
-              </a:p>
-            </p:txBody>
-          </p:sp>
-        </mc:Choice>
-        <mc:Fallback>
-          <p:sp>
-            <p:nvSpPr>
-              <p:cNvPr id="20" name="Textfeld 19">
-                <a:extLst>
-                  <a:ext uri="{FF2B5EF4-FFF2-40B4-BE49-F238E27FC236}">
-                    <a16:creationId xmlns:a16="http://schemas.microsoft.com/office/drawing/2014/main" id="{2802209C-1AD8-4823-B27E-CFFAD01F1DDF}"/>
-                  </a:ext>
-                </a:extLst>
-              </p:cNvPr>
-              <p:cNvSpPr txBox="1">
-                <a:spLocks noRot="1" noChangeAspect="1" noMove="1" noResize="1" noEditPoints="1" noAdjustHandles="1" noChangeArrowheads="1" noChangeShapeType="1" noTextEdit="1"/>
-              </p:cNvSpPr>
-              <p:nvPr/>
-            </p:nvSpPr>
-            <p:spPr>
-              <a:xfrm>
-                <a:off x="730690" y="3566770"/>
-                <a:ext cx="333369" cy="153888"/>
-              </a:xfrm>
-              <a:prstGeom prst="rect">
-                <a:avLst/>
-              </a:prstGeom>
-              <a:blipFill>
-                <a:blip r:embed="rId2"/>
-                <a:stretch>
-                  <a:fillRect b="-28000"/>
-                </a:stretch>
-              </a:blipFill>
-            </p:spPr>
-            <p:txBody>
-              <a:bodyPr/>
-              <a:lstStyle/>
-              <a:p>
-                <a:r>
-                  <a:rPr lang="de-DE">
-                    <a:noFill/>
-                  </a:rPr>
-                  <a:t> </a:t>
-                </a:r>
-              </a:p>
-            </p:txBody>
-          </p:sp>
-        </mc:Fallback>
-      </mc:AlternateContent>
-      <p:sp>
-        <p:nvSpPr>
-          <p:cNvPr id="22" name="Ellipse 21">
-            <a:extLst>
-              <a:ext uri="{FF2B5EF4-FFF2-40B4-BE49-F238E27FC236}">
-                <a16:creationId xmlns:a16="http://schemas.microsoft.com/office/drawing/2014/main" id="{61E5ACAB-0A7E-4B63-9041-A2CCEEBEFC42}"/>
-              </a:ext>
-            </a:extLst>
-          </p:cNvPr>
-          <p:cNvSpPr/>
-          <p:nvPr/>
-        </p:nvSpPr>
-        <p:spPr>
-          <a:xfrm>
-            <a:off x="1237659" y="3705270"/>
-            <a:ext cx="60736" cy="60736"/>
-          </a:xfrm>
-          <a:prstGeom prst="ellipse">
-            <a:avLst/>
-          </a:prstGeom>
-          <a:solidFill>
-            <a:schemeClr val="tx1">
-              <a:lumMod val="85000"/>
-              <a:lumOff val="15000"/>
-            </a:schemeClr>
-          </a:solidFill>
-          <a:ln>
-            <a:noFill/>
-          </a:ln>
-          <a:effectLst/>
-          <a:scene3d>
-            <a:camera prst="isometricOffAxis1Top"/>
-            <a:lightRig rig="threePt" dir="t"/>
-          </a:scene3d>
-          <a:sp3d>
-            <a:bevelT w="30480" h="30480"/>
-            <a:bevelB w="30480" h="30480"/>
-          </a:sp3d>
-        </p:spPr>
-        <p:style>
-          <a:lnRef idx="2">
-            <a:schemeClr val="accent1">
-              <a:shade val="50000"/>
-            </a:schemeClr>
-          </a:lnRef>
-          <a:fillRef idx="1">
-            <a:schemeClr val="accent1"/>
-          </a:fillRef>
-          <a:effectRef idx="0">
-            <a:schemeClr val="accent1"/>
-          </a:effectRef>
-          <a:fontRef idx="minor">
-            <a:schemeClr val="lt1"/>
-          </a:fontRef>
-        </p:style>
-        <p:txBody>
-          <a:bodyPr rot="0" spcFirstLastPara="0" vertOverflow="overflow" horzOverflow="overflow" vert="horz" wrap="square" lIns="91440" tIns="45720" rIns="91440" bIns="45720" numCol="1" spcCol="0" rtlCol="0" fromWordArt="0" anchor="ctr" anchorCtr="0" forceAA="0" compatLnSpc="1">
-            <a:prstTxWarp prst="textNoShape">
-              <a:avLst/>
-            </a:prstTxWarp>
-            <a:noAutofit/>
-          </a:bodyPr>
-          <a:lstStyle/>
-          <a:p>
-            <a:pPr algn="ctr"/>
-            <a:endParaRPr lang="de-DE"/>
-          </a:p>
-        </p:txBody>
-      </p:sp>
-      <mc:AlternateContent xmlns:mc="http://schemas.openxmlformats.org/markup-compatibility/2006">
-        <mc:Choice xmlns:a14="http://schemas.microsoft.com/office/drawing/2010/main" Requires="a14">
-          <p:sp>
-            <p:nvSpPr>
-              <p:cNvPr id="23" name="Textfeld 22">
-                <a:extLst>
-                  <a:ext uri="{FF2B5EF4-FFF2-40B4-BE49-F238E27FC236}">
-                    <a16:creationId xmlns:a16="http://schemas.microsoft.com/office/drawing/2014/main" id="{532379D3-D776-4EC3-9B88-11D8612F6E83}"/>
-                  </a:ext>
-                </a:extLst>
-              </p:cNvPr>
-              <p:cNvSpPr txBox="1"/>
-              <p:nvPr/>
-            </p:nvSpPr>
-            <p:spPr>
-              <a:xfrm>
-                <a:off x="1534089" y="3670345"/>
-                <a:ext cx="333369" cy="153888"/>
-              </a:xfrm>
-              <a:prstGeom prst="rect">
-                <a:avLst/>
-              </a:prstGeom>
-              <a:noFill/>
-            </p:spPr>
-            <p:txBody>
-              <a:bodyPr wrap="square" lIns="0" tIns="0" rIns="0" bIns="0" rtlCol="0">
-                <a:spAutoFit/>
-              </a:bodyPr>
-              <a:lstStyle/>
-              <a:p>
-                <a14:m>
-                  <m:oMathPara xmlns:m="http://schemas.openxmlformats.org/officeDocument/2006/math">
-                    <m:oMathParaPr>
-                      <m:jc m:val="centerGroup"/>
-                    </m:oMathParaPr>
-                    <m:oMath xmlns:m="http://schemas.openxmlformats.org/officeDocument/2006/math">
-                      <m:r>
-                        <a:rPr lang="de-DE" sz="1000" b="0" i="1" dirty="0" smtClean="0">
-                          <a:latin typeface="Cambria Math" panose="02040503050406030204" pitchFamily="18" charset="0"/>
-                        </a:rPr>
-                        <m:t>𝑥</m:t>
-                      </m:r>
-                    </m:oMath>
-                  </m:oMathPara>
-                </a14:m>
-                <a:endParaRPr lang="de-DE" sz="1000" dirty="0"/>
-              </a:p>
-            </p:txBody>
-          </p:sp>
-        </mc:Choice>
-        <mc:Fallback>
-          <p:sp>
-            <p:nvSpPr>
-              <p:cNvPr id="23" name="Textfeld 22">
-                <a:extLst>
-                  <a:ext uri="{FF2B5EF4-FFF2-40B4-BE49-F238E27FC236}">
-                    <a16:creationId xmlns:a16="http://schemas.microsoft.com/office/drawing/2014/main" id="{532379D3-D776-4EC3-9B88-11D8612F6E83}"/>
-                  </a:ext>
-                </a:extLst>
-              </p:cNvPr>
-              <p:cNvSpPr txBox="1">
-                <a:spLocks noRot="1" noChangeAspect="1" noMove="1" noResize="1" noEditPoints="1" noAdjustHandles="1" noChangeArrowheads="1" noChangeShapeType="1" noTextEdit="1"/>
-              </p:cNvSpPr>
-              <p:nvPr/>
-            </p:nvSpPr>
-            <p:spPr>
-              <a:xfrm>
-                <a:off x="1534089" y="3670345"/>
-                <a:ext cx="333369" cy="153888"/>
-              </a:xfrm>
-              <a:prstGeom prst="rect">
-                <a:avLst/>
-              </a:prstGeom>
-              <a:blipFill>
-                <a:blip r:embed="rId3"/>
-                <a:stretch>
-                  <a:fillRect b="-4000"/>
-                </a:stretch>
-              </a:blipFill>
-            </p:spPr>
-            <p:txBody>
-              <a:bodyPr/>
-              <a:lstStyle/>
-              <a:p>
-                <a:r>
-                  <a:rPr lang="de-DE">
-                    <a:noFill/>
-                  </a:rPr>
-                  <a:t> </a:t>
-                </a:r>
-              </a:p>
-            </p:txBody>
-          </p:sp>
-        </mc:Fallback>
-      </mc:AlternateContent>
-      <mc:AlternateContent xmlns:mc="http://schemas.openxmlformats.org/markup-compatibility/2006">
-        <mc:Choice xmlns:a14="http://schemas.microsoft.com/office/drawing/2010/main" Requires="a14">
-          <p:sp>
-            <p:nvSpPr>
-              <p:cNvPr id="24" name="Textfeld 23">
-                <a:extLst>
-                  <a:ext uri="{FF2B5EF4-FFF2-40B4-BE49-F238E27FC236}">
-                    <a16:creationId xmlns:a16="http://schemas.microsoft.com/office/drawing/2014/main" id="{B0953C6D-1B61-4364-93CB-ACDEE50C1FA8}"/>
-                  </a:ext>
-                </a:extLst>
-              </p:cNvPr>
-              <p:cNvSpPr txBox="1"/>
-              <p:nvPr/>
-            </p:nvSpPr>
-            <p:spPr>
-              <a:xfrm>
-                <a:off x="1268026" y="3218721"/>
-                <a:ext cx="333369" cy="153888"/>
-              </a:xfrm>
-              <a:prstGeom prst="rect">
-                <a:avLst/>
-              </a:prstGeom>
-              <a:noFill/>
-            </p:spPr>
-            <p:txBody>
-              <a:bodyPr wrap="square" lIns="0" tIns="0" rIns="0" bIns="0" rtlCol="0">
-                <a:spAutoFit/>
-              </a:bodyPr>
-              <a:lstStyle/>
-              <a:p>
-                <a14:m>
-                  <m:oMathPara xmlns:m="http://schemas.openxmlformats.org/officeDocument/2006/math">
-                    <m:oMathParaPr>
-                      <m:jc m:val="centerGroup"/>
-                    </m:oMathParaPr>
-                    <m:oMath xmlns:m="http://schemas.openxmlformats.org/officeDocument/2006/math">
-                      <m:r>
-                        <a:rPr lang="de-DE" sz="1000" b="0" i="1" dirty="0" smtClean="0">
-                          <a:latin typeface="Cambria Math" panose="02040503050406030204" pitchFamily="18" charset="0"/>
-                        </a:rPr>
-                        <m:t>𝑧</m:t>
-                      </m:r>
-                    </m:oMath>
-                  </m:oMathPara>
-                </a14:m>
-                <a:endParaRPr lang="de-DE" sz="1000" dirty="0"/>
-              </a:p>
-            </p:txBody>
-          </p:sp>
-        </mc:Choice>
-        <mc:Fallback>
-          <p:sp>
-            <p:nvSpPr>
-              <p:cNvPr id="24" name="Textfeld 23">
-                <a:extLst>
-                  <a:ext uri="{FF2B5EF4-FFF2-40B4-BE49-F238E27FC236}">
-                    <a16:creationId xmlns:a16="http://schemas.microsoft.com/office/drawing/2014/main" id="{B0953C6D-1B61-4364-93CB-ACDEE50C1FA8}"/>
-                  </a:ext>
-                </a:extLst>
-              </p:cNvPr>
-              <p:cNvSpPr txBox="1">
-                <a:spLocks noRot="1" noChangeAspect="1" noMove="1" noResize="1" noEditPoints="1" noAdjustHandles="1" noChangeArrowheads="1" noChangeShapeType="1" noTextEdit="1"/>
-              </p:cNvSpPr>
-              <p:nvPr/>
-            </p:nvSpPr>
-            <p:spPr>
-              <a:xfrm>
-                <a:off x="1268026" y="3218721"/>
-                <a:ext cx="333369" cy="153888"/>
-              </a:xfrm>
-              <a:prstGeom prst="rect">
-                <a:avLst/>
-              </a:prstGeom>
-              <a:blipFill>
-                <a:blip r:embed="rId4"/>
-                <a:stretch>
-                  <a:fillRect b="-4000"/>
-                </a:stretch>
-              </a:blipFill>
-            </p:spPr>
-            <p:txBody>
-              <a:bodyPr/>
-              <a:lstStyle/>
-              <a:p>
-                <a:r>
-                  <a:rPr lang="de-DE">
-                    <a:noFill/>
-                  </a:rPr>
-                  <a:t> </a:t>
-                </a:r>
-              </a:p>
-            </p:txBody>
-          </p:sp>
-        </mc:Fallback>
-      </mc:AlternateContent>
-      <p:cxnSp>
-        <p:nvCxnSpPr>
-          <p:cNvPr id="33" name="Gerade Verbindung mit Pfeil 32">
-            <a:extLst>
-              <a:ext uri="{FF2B5EF4-FFF2-40B4-BE49-F238E27FC236}">
-                <a16:creationId xmlns:a16="http://schemas.microsoft.com/office/drawing/2014/main" id="{A06EC633-79A1-46A1-B241-8A7D3CCB480C}"/>
-              </a:ext>
-            </a:extLst>
-          </p:cNvPr>
-          <p:cNvCxnSpPr>
-            <a:cxnSpLocks/>
-          </p:cNvCxnSpPr>
-          <p:nvPr/>
-        </p:nvCxnSpPr>
-        <p:spPr>
-          <a:xfrm flipV="1">
-            <a:off x="3704663" y="3433487"/>
+            <a:off x="3704663" y="3152036"/>
             <a:ext cx="710187" cy="139701"/>
           </a:xfrm>
           <a:prstGeom prst="straightConnector1">
@@ -4141,7 +3651,7 @@
         </p:nvCxnSpPr>
         <p:spPr>
           <a:xfrm flipH="1" flipV="1">
-            <a:off x="3075615" y="3273750"/>
+            <a:off x="3075615" y="2992299"/>
             <a:ext cx="629048" cy="299437"/>
           </a:xfrm>
           <a:prstGeom prst="straightConnector1">
@@ -4188,7 +3698,7 @@
             </p:nvSpPr>
             <p:spPr>
               <a:xfrm>
-                <a:off x="2841652" y="3226338"/>
+                <a:off x="2841652" y="2944887"/>
                 <a:ext cx="333369" cy="153888"/>
               </a:xfrm>
               <a:prstGeom prst="rect">
@@ -4202,6 +3712,7 @@
               </a:bodyPr>
               <a:lstStyle/>
               <a:p>
+                <a:pPr/>
                 <a14:m>
                   <m:oMathPara xmlns:m="http://schemas.openxmlformats.org/officeDocument/2006/math">
                     <m:oMathParaPr>
@@ -4239,7 +3750,7 @@
             </p:nvSpPr>
             <p:spPr>
               <a:xfrm>
-                <a:off x="2841652" y="3226338"/>
+                <a:off x="2841652" y="2944887"/>
                 <a:ext cx="333369" cy="153888"/>
               </a:xfrm>
               <a:prstGeom prst="rect">
@@ -4283,7 +3794,7 @@
             </p:nvSpPr>
             <p:spPr>
               <a:xfrm>
-                <a:off x="4331892" y="3331772"/>
+                <a:off x="4331892" y="3050321"/>
                 <a:ext cx="333369" cy="153888"/>
               </a:xfrm>
               <a:prstGeom prst="rect">
@@ -4297,6 +3808,7 @@
               </a:bodyPr>
               <a:lstStyle/>
               <a:p>
+                <a:pPr/>
                 <a14:m>
                   <m:oMathPara xmlns:m="http://schemas.openxmlformats.org/officeDocument/2006/math">
                     <m:oMathParaPr>
@@ -4334,14 +3846,14 @@
             </p:nvSpPr>
             <p:spPr>
               <a:xfrm>
-                <a:off x="4331892" y="3331772"/>
+                <a:off x="4331892" y="3050321"/>
                 <a:ext cx="333369" cy="153888"/>
               </a:xfrm>
               <a:prstGeom prst="rect">
                 <a:avLst/>
               </a:prstGeom>
               <a:blipFill>
-                <a:blip r:embed="rId5"/>
+                <a:blip r:embed="rId3"/>
                 <a:stretch>
                   <a:fillRect/>
                 </a:stretch>
@@ -4378,7 +3890,7 @@
             </p:nvSpPr>
             <p:spPr>
               <a:xfrm>
-                <a:off x="3704663" y="2415262"/>
+                <a:off x="3624344" y="2483258"/>
                 <a:ext cx="333369" cy="153888"/>
               </a:xfrm>
               <a:prstGeom prst="rect">
@@ -4392,6 +3904,7 @@
               </a:bodyPr>
               <a:lstStyle/>
               <a:p>
+                <a:pPr/>
                 <a14:m>
                   <m:oMathPara xmlns:m="http://schemas.openxmlformats.org/officeDocument/2006/math">
                     <m:oMathParaPr>
@@ -4429,16 +3942,16 @@
             </p:nvSpPr>
             <p:spPr>
               <a:xfrm>
-                <a:off x="3704663" y="2415262"/>
+                <a:off x="3624344" y="2483258"/>
                 <a:ext cx="333369" cy="153888"/>
               </a:xfrm>
               <a:prstGeom prst="rect">
                 <a:avLst/>
               </a:prstGeom>
               <a:blipFill>
-                <a:blip r:embed="rId6"/>
+                <a:blip r:embed="rId4"/>
                 <a:stretch>
-                  <a:fillRect b="-4000"/>
+                  <a:fillRect/>
                 </a:stretch>
               </a:blipFill>
             </p:spPr>
@@ -4598,8 +4111,8 @@
           </a:fontRef>
         </p:style>
       </p:cxnSp>
-      <mc:AlternateContent xmlns:mc="http://schemas.openxmlformats.org/markup-compatibility/2006">
-        <mc:Choice xmlns:a14="http://schemas.microsoft.com/office/drawing/2010/main" Requires="a14">
+      <mc:AlternateContent xmlns:mc="http://schemas.openxmlformats.org/markup-compatibility/2006" xmlns:a14="http://schemas.microsoft.com/office/drawing/2010/main">
+        <mc:Choice Requires="a14">
           <p:sp>
             <p:nvSpPr>
               <p:cNvPr id="49" name="Textfeld 48">
@@ -4628,6 +4141,7 @@
               </a:bodyPr>
               <a:lstStyle/>
               <a:p>
+                <a:pPr/>
                 <a14:m>
                   <m:oMathPara xmlns:m="http://schemas.openxmlformats.org/officeDocument/2006/math">
                     <m:oMathParaPr>
@@ -4648,7 +4162,7 @@
             </p:txBody>
           </p:sp>
         </mc:Choice>
-        <mc:Fallback>
+        <mc:Fallback xmlns="">
           <p:sp>
             <p:nvSpPr>
               <p:cNvPr id="49" name="Textfeld 48">
@@ -4672,7 +4186,7 @@
                 <a:avLst/>
               </a:prstGeom>
               <a:blipFill>
-                <a:blip r:embed="rId7"/>
+                <a:blip r:embed="rId8"/>
                 <a:stretch>
                   <a:fillRect b="-24000"/>
                 </a:stretch>
@@ -4762,8 +4276,8 @@
           </a:p>
         </p:txBody>
       </p:sp>
-      <mc:AlternateContent xmlns:mc="http://schemas.openxmlformats.org/markup-compatibility/2006">
-        <mc:Choice xmlns:a14="http://schemas.microsoft.com/office/drawing/2010/main" Requires="a14">
+      <mc:AlternateContent xmlns:mc="http://schemas.openxmlformats.org/markup-compatibility/2006" xmlns:a14="http://schemas.microsoft.com/office/drawing/2010/main">
+        <mc:Choice Requires="a14">
           <p:sp>
             <p:nvSpPr>
               <p:cNvPr id="51" name="Textfeld 50">
@@ -4792,6 +4306,7 @@
               </a:bodyPr>
               <a:lstStyle/>
               <a:p>
+                <a:pPr/>
                 <a14:m>
                   <m:oMathPara xmlns:m="http://schemas.openxmlformats.org/officeDocument/2006/math">
                     <m:oMathParaPr>
@@ -4812,7 +4327,7 @@
             </p:txBody>
           </p:sp>
         </mc:Choice>
-        <mc:Fallback>
+        <mc:Fallback xmlns="">
           <p:sp>
             <p:nvSpPr>
               <p:cNvPr id="51" name="Textfeld 50">
@@ -4836,7 +4351,7 @@
                 <a:avLst/>
               </a:prstGeom>
               <a:blipFill>
-                <a:blip r:embed="rId3"/>
+                <a:blip r:embed="rId9"/>
                 <a:stretch>
                   <a:fillRect b="-4000"/>
                 </a:stretch>
@@ -4873,7 +4388,7 @@
             </p:nvSpPr>
             <p:spPr>
               <a:xfrm>
-                <a:off x="5960997" y="2286360"/>
+                <a:off x="5902919" y="2312858"/>
                 <a:ext cx="333369" cy="153888"/>
               </a:xfrm>
               <a:prstGeom prst="rect">
@@ -4887,6 +4402,7 @@
               </a:bodyPr>
               <a:lstStyle/>
               <a:p>
+                <a:pPr/>
                 <a14:m>
                   <m:oMathPara xmlns:m="http://schemas.openxmlformats.org/officeDocument/2006/math">
                     <m:oMathParaPr>
@@ -4924,16 +4440,16 @@
             </p:nvSpPr>
             <p:spPr>
               <a:xfrm>
-                <a:off x="5960997" y="2286360"/>
+                <a:off x="5902919" y="2312858"/>
                 <a:ext cx="333369" cy="153888"/>
               </a:xfrm>
               <a:prstGeom prst="rect">
                 <a:avLst/>
               </a:prstGeom>
               <a:blipFill>
-                <a:blip r:embed="rId4"/>
+                <a:blip r:embed="rId10"/>
                 <a:stretch>
-                  <a:fillRect b="-4000"/>
+                  <a:fillRect/>
                 </a:stretch>
               </a:blipFill>
             </p:spPr>
@@ -5098,150 +4614,104 @@
           </a:fontRef>
         </p:style>
       </p:cxnSp>
-      <p:sp>
-        <p:nvSpPr>
-          <p:cNvPr id="66" name="Textfeld 65">
-            <a:extLst>
-              <a:ext uri="{FF2B5EF4-FFF2-40B4-BE49-F238E27FC236}">
-                <a16:creationId xmlns:a16="http://schemas.microsoft.com/office/drawing/2014/main" id="{E2ACCE51-E39E-48DA-BCEA-0C9E9A9F2BD3}"/>
-              </a:ext>
-            </a:extLst>
-          </p:cNvPr>
-          <p:cNvSpPr txBox="1"/>
-          <p:nvPr/>
-        </p:nvSpPr>
-        <p:spPr>
-          <a:xfrm>
-            <a:off x="1572828" y="3757501"/>
-            <a:ext cx="516488" cy="246221"/>
-          </a:xfrm>
-          <a:prstGeom prst="rect">
-            <a:avLst/>
-          </a:prstGeom>
-          <a:noFill/>
-        </p:spPr>
-        <p:txBody>
-          <a:bodyPr wrap="none" rtlCol="0">
-            <a:spAutoFit/>
-          </a:bodyPr>
-          <a:lstStyle/>
-          <a:p>
-            <a:r>
-              <a:rPr lang="de-DE" sz="1000" dirty="0" err="1"/>
-              <a:t>length</a:t>
-            </a:r>
-            <a:endParaRPr lang="de-DE" sz="1000" dirty="0"/>
-          </a:p>
-        </p:txBody>
-      </p:sp>
-      <p:sp>
-        <p:nvSpPr>
-          <p:cNvPr id="67" name="Textfeld 66">
-            <a:extLst>
-              <a:ext uri="{FF2B5EF4-FFF2-40B4-BE49-F238E27FC236}">
-                <a16:creationId xmlns:a16="http://schemas.microsoft.com/office/drawing/2014/main" id="{89CBC0DE-6F20-4977-893D-5A5BA39186EA}"/>
-              </a:ext>
-            </a:extLst>
-          </p:cNvPr>
-          <p:cNvSpPr txBox="1"/>
-          <p:nvPr/>
-        </p:nvSpPr>
-        <p:spPr>
-          <a:xfrm>
-            <a:off x="1307841" y="3309591"/>
-            <a:ext cx="516488" cy="246221"/>
-          </a:xfrm>
-          <a:prstGeom prst="rect">
-            <a:avLst/>
-          </a:prstGeom>
-          <a:noFill/>
-        </p:spPr>
-        <p:txBody>
-          <a:bodyPr wrap="none" rtlCol="0">
-            <a:spAutoFit/>
-          </a:bodyPr>
-          <a:lstStyle/>
-          <a:p>
-            <a:r>
-              <a:rPr lang="de-DE" sz="1000" dirty="0" err="1"/>
-              <a:t>height</a:t>
-            </a:r>
-            <a:endParaRPr lang="de-DE" sz="1000" dirty="0"/>
-          </a:p>
-        </p:txBody>
-      </p:sp>
-      <p:sp>
-        <p:nvSpPr>
-          <p:cNvPr id="68" name="Textfeld 67">
-            <a:extLst>
-              <a:ext uri="{FF2B5EF4-FFF2-40B4-BE49-F238E27FC236}">
-                <a16:creationId xmlns:a16="http://schemas.microsoft.com/office/drawing/2014/main" id="{F03695D7-4B2C-454F-B4CD-F55C941E5BA0}"/>
-              </a:ext>
-            </a:extLst>
-          </p:cNvPr>
-          <p:cNvSpPr txBox="1"/>
-          <p:nvPr/>
-        </p:nvSpPr>
-        <p:spPr>
-          <a:xfrm>
-            <a:off x="760124" y="3650809"/>
-            <a:ext cx="482824" cy="246221"/>
-          </a:xfrm>
-          <a:prstGeom prst="rect">
-            <a:avLst/>
-          </a:prstGeom>
-          <a:noFill/>
-        </p:spPr>
-        <p:txBody>
-          <a:bodyPr wrap="none" rtlCol="0">
-            <a:spAutoFit/>
-          </a:bodyPr>
-          <a:lstStyle/>
-          <a:p>
-            <a:r>
-              <a:rPr lang="de-DE" sz="1000" dirty="0" err="1"/>
-              <a:t>width</a:t>
-            </a:r>
-            <a:endParaRPr lang="de-DE" sz="1000" dirty="0"/>
-          </a:p>
-        </p:txBody>
-      </p:sp>
-      <p:sp>
-        <p:nvSpPr>
-          <p:cNvPr id="69" name="Textfeld 68">
-            <a:extLst>
-              <a:ext uri="{FF2B5EF4-FFF2-40B4-BE49-F238E27FC236}">
-                <a16:creationId xmlns:a16="http://schemas.microsoft.com/office/drawing/2014/main" id="{AB3BFBA5-09F1-448A-BF89-7BEB2AC34E3A}"/>
-              </a:ext>
-            </a:extLst>
-          </p:cNvPr>
-          <p:cNvSpPr txBox="1"/>
-          <p:nvPr/>
-        </p:nvSpPr>
-        <p:spPr>
-          <a:xfrm>
-            <a:off x="2724619" y="2873525"/>
-            <a:ext cx="516488" cy="246221"/>
-          </a:xfrm>
-          <a:prstGeom prst="rect">
-            <a:avLst/>
-          </a:prstGeom>
-          <a:noFill/>
-        </p:spPr>
-        <p:txBody>
-          <a:bodyPr wrap="none" rtlCol="0">
-            <a:spAutoFit/>
-          </a:bodyPr>
-          <a:lstStyle/>
-          <a:p>
-            <a:r>
-              <a:rPr lang="de-DE" sz="1000" dirty="0" err="1"/>
-              <a:t>height</a:t>
-            </a:r>
-            <a:endParaRPr lang="de-DE" sz="1000" dirty="0"/>
-          </a:p>
-        </p:txBody>
-      </p:sp>
+      <mc:AlternateContent xmlns:mc="http://schemas.openxmlformats.org/markup-compatibility/2006">
+        <mc:Choice xmlns:a14="http://schemas.microsoft.com/office/drawing/2010/main" Requires="a14">
+          <p:sp>
+            <p:nvSpPr>
+              <p:cNvPr id="69" name="Textfeld 68">
+                <a:extLst>
+                  <a:ext uri="{FF2B5EF4-FFF2-40B4-BE49-F238E27FC236}">
+                    <a16:creationId xmlns:a16="http://schemas.microsoft.com/office/drawing/2014/main" id="{AB3BFBA5-09F1-448A-BF89-7BEB2AC34E3A}"/>
+                  </a:ext>
+                </a:extLst>
+              </p:cNvPr>
+              <p:cNvSpPr txBox="1"/>
+              <p:nvPr/>
+            </p:nvSpPr>
+            <p:spPr>
+              <a:xfrm>
+                <a:off x="2603471" y="3156342"/>
+                <a:ext cx="618054" cy="246221"/>
+              </a:xfrm>
+              <a:prstGeom prst="rect">
+                <a:avLst/>
+              </a:prstGeom>
+              <a:noFill/>
+            </p:spPr>
+            <p:txBody>
+              <a:bodyPr wrap="none" rtlCol="0">
+                <a:spAutoFit/>
+              </a:bodyPr>
+              <a:lstStyle/>
+              <a:p>
+                <a:r>
+                  <a:rPr lang="de-DE" sz="1000" dirty="0" err="1"/>
+                  <a:t>height</a:t>
+                </a:r>
+                <a:r>
+                  <a:rPr lang="de-DE" sz="1000" dirty="0"/>
+                  <a:t> </a:t>
+                </a:r>
+                <a14:m>
+                  <m:oMath xmlns:m="http://schemas.openxmlformats.org/officeDocument/2006/math">
+                    <m:r>
+                      <a:rPr lang="de-DE" sz="1000" i="1" dirty="0" smtClean="0">
+                        <a:latin typeface="Cambria Math" panose="02040503050406030204" pitchFamily="18" charset="0"/>
+                      </a:rPr>
+                      <m:t>h</m:t>
+                    </m:r>
+                  </m:oMath>
+                </a14:m>
+                <a:endParaRPr lang="de-DE" sz="1000" dirty="0"/>
+              </a:p>
+            </p:txBody>
+          </p:sp>
+        </mc:Choice>
+        <mc:Fallback>
+          <p:sp>
+            <p:nvSpPr>
+              <p:cNvPr id="69" name="Textfeld 68">
+                <a:extLst>
+                  <a:ext uri="{FF2B5EF4-FFF2-40B4-BE49-F238E27FC236}">
+                    <a16:creationId xmlns:a16="http://schemas.microsoft.com/office/drawing/2014/main" id="{AB3BFBA5-09F1-448A-BF89-7BEB2AC34E3A}"/>
+                  </a:ext>
+                </a:extLst>
+              </p:cNvPr>
+              <p:cNvSpPr txBox="1">
+                <a:spLocks noRot="1" noChangeAspect="1" noMove="1" noResize="1" noEditPoints="1" noAdjustHandles="1" noChangeArrowheads="1" noChangeShapeType="1" noTextEdit="1"/>
+              </p:cNvSpPr>
+              <p:nvPr/>
+            </p:nvSpPr>
+            <p:spPr>
+              <a:xfrm>
+                <a:off x="2603471" y="3156342"/>
+                <a:ext cx="618054" cy="246221"/>
+              </a:xfrm>
+              <a:prstGeom prst="rect">
+                <a:avLst/>
+              </a:prstGeom>
+              <a:blipFill>
+                <a:blip r:embed="rId11"/>
+                <a:stretch>
+                  <a:fillRect b="-15000"/>
+                </a:stretch>
+              </a:blipFill>
+            </p:spPr>
+            <p:txBody>
+              <a:bodyPr/>
+              <a:lstStyle/>
+              <a:p>
+                <a:r>
+                  <a:rPr lang="de-DE">
+                    <a:noFill/>
+                  </a:rPr>
+                  <a:t> </a:t>
+                </a:r>
+              </a:p>
+            </p:txBody>
+          </p:sp>
+        </mc:Fallback>
+      </mc:AlternateContent>
       <p:sp>
         <p:nvSpPr>
           <p:cNvPr id="70" name="Textfeld 69">
@@ -5336,13 +4806,15 @@
               </a:ext>
             </a:extLst>
           </p:cNvPr>
-          <p:cNvCxnSpPr/>
+          <p:cNvCxnSpPr>
+            <a:cxnSpLocks/>
+          </p:cNvCxnSpPr>
           <p:nvPr/>
         </p:nvCxnSpPr>
         <p:spPr>
           <a:xfrm>
-            <a:off x="3175021" y="3099648"/>
-            <a:ext cx="458399" cy="153240"/>
+            <a:off x="3131524" y="3350268"/>
+            <a:ext cx="505509" cy="59714"/>
           </a:xfrm>
           <a:prstGeom prst="line">
             <a:avLst/>
@@ -5463,75 +4935,6 @@
           </a:fontRef>
         </p:style>
       </p:cxnSp>
-      <p:sp>
-        <p:nvSpPr>
-          <p:cNvPr id="37" name="Ellipse 36">
-            <a:extLst>
-              <a:ext uri="{FF2B5EF4-FFF2-40B4-BE49-F238E27FC236}">
-                <a16:creationId xmlns:a16="http://schemas.microsoft.com/office/drawing/2014/main" id="{5FE1D8E3-61D4-4FFE-AF53-C92B92D88599}"/>
-              </a:ext>
-            </a:extLst>
-          </p:cNvPr>
-          <p:cNvSpPr/>
-          <p:nvPr/>
-        </p:nvSpPr>
-        <p:spPr>
-          <a:xfrm>
-            <a:off x="3674295" y="3512862"/>
-            <a:ext cx="60736" cy="60736"/>
-          </a:xfrm>
-          <a:prstGeom prst="ellipse">
-            <a:avLst/>
-          </a:prstGeom>
-          <a:solidFill>
-            <a:schemeClr val="tx1">
-              <a:lumMod val="85000"/>
-              <a:lumOff val="15000"/>
-            </a:schemeClr>
-          </a:solidFill>
-          <a:ln>
-            <a:noFill/>
-          </a:ln>
-          <a:effectLst/>
-          <a:scene3d>
-            <a:camera prst="isometricOffAxis1Top"/>
-            <a:lightRig rig="threePt" dir="t"/>
-          </a:scene3d>
-          <a:sp3d>
-            <a:bevelT w="30480" h="30480"/>
-            <a:bevelB w="30480" h="30480"/>
-          </a:sp3d>
-        </p:spPr>
-        <p:style>
-          <a:lnRef idx="2">
-            <a:schemeClr val="accent1">
-              <a:shade val="50000"/>
-            </a:schemeClr>
-          </a:lnRef>
-          <a:fillRef idx="1">
-            <a:schemeClr val="accent1"/>
-          </a:fillRef>
-          <a:effectRef idx="0">
-            <a:schemeClr val="accent1"/>
-          </a:effectRef>
-          <a:fontRef idx="minor">
-            <a:schemeClr val="lt1"/>
-          </a:fontRef>
-        </p:style>
-        <p:txBody>
-          <a:bodyPr rot="0" spcFirstLastPara="0" vertOverflow="overflow" horzOverflow="overflow" vert="horz" wrap="square" lIns="91440" tIns="45720" rIns="91440" bIns="45720" numCol="1" spcCol="0" rtlCol="0" fromWordArt="0" anchor="ctr" anchorCtr="0" forceAA="0" compatLnSpc="1">
-            <a:prstTxWarp prst="textNoShape">
-              <a:avLst/>
-            </a:prstTxWarp>
-            <a:noAutofit/>
-          </a:bodyPr>
-          <a:lstStyle/>
-          <a:p>
-            <a:pPr algn="ctr"/>
-            <a:endParaRPr lang="de-DE"/>
-          </a:p>
-        </p:txBody>
-      </p:sp>
       <p:sp>
         <p:nvSpPr>
           <p:cNvPr id="79" name="Textfeld 78">
@@ -5868,8 +5271,8 @@
           </a:fontRef>
         </p:style>
       </p:cxnSp>
-      <mc:AlternateContent xmlns:mc="http://schemas.openxmlformats.org/markup-compatibility/2006">
-        <mc:Choice xmlns:a14="http://schemas.microsoft.com/office/drawing/2010/main" Requires="a14">
+      <mc:AlternateContent xmlns:mc="http://schemas.openxmlformats.org/markup-compatibility/2006" xmlns:a14="http://schemas.microsoft.com/office/drawing/2010/main">
+        <mc:Choice Requires="a14">
           <p:sp>
             <p:nvSpPr>
               <p:cNvPr id="88" name="Textfeld 87">
@@ -5898,6 +5301,7 @@
               </a:bodyPr>
               <a:lstStyle/>
               <a:p>
+                <a:pPr/>
                 <a14:m>
                   <m:oMathPara xmlns:m="http://schemas.openxmlformats.org/officeDocument/2006/math">
                     <m:oMathParaPr>
@@ -5918,7 +5322,7 @@
             </p:txBody>
           </p:sp>
         </mc:Choice>
-        <mc:Fallback>
+        <mc:Fallback xmlns="">
           <p:sp>
             <p:nvSpPr>
               <p:cNvPr id="88" name="Textfeld 87">
@@ -5942,7 +5346,7 @@
                 <a:avLst/>
               </a:prstGeom>
               <a:blipFill>
-                <a:blip r:embed="rId2"/>
+                <a:blip r:embed="rId5"/>
                 <a:stretch>
                   <a:fillRect b="-28000"/>
                 </a:stretch>
@@ -6032,8 +5436,8 @@
           </a:p>
         </p:txBody>
       </p:sp>
-      <mc:AlternateContent xmlns:mc="http://schemas.openxmlformats.org/markup-compatibility/2006">
-        <mc:Choice xmlns:a14="http://schemas.microsoft.com/office/drawing/2010/main" Requires="a14">
+      <mc:AlternateContent xmlns:mc="http://schemas.openxmlformats.org/markup-compatibility/2006" xmlns:a14="http://schemas.microsoft.com/office/drawing/2010/main">
+        <mc:Choice Requires="a14">
           <p:sp>
             <p:nvSpPr>
               <p:cNvPr id="90" name="Textfeld 89">
@@ -6062,6 +5466,7 @@
               </a:bodyPr>
               <a:lstStyle/>
               <a:p>
+                <a:pPr/>
                 <a14:m>
                   <m:oMathPara xmlns:m="http://schemas.openxmlformats.org/officeDocument/2006/math">
                     <m:oMathParaPr>
@@ -6082,7 +5487,7 @@
             </p:txBody>
           </p:sp>
         </mc:Choice>
-        <mc:Fallback>
+        <mc:Fallback xmlns="">
           <p:sp>
             <p:nvSpPr>
               <p:cNvPr id="90" name="Textfeld 89">
@@ -6106,7 +5511,7 @@
                 <a:avLst/>
               </a:prstGeom>
               <a:blipFill>
-                <a:blip r:embed="rId8"/>
+                <a:blip r:embed="rId12"/>
                 <a:stretch>
                   <a:fillRect b="-4000"/>
                 </a:stretch>
@@ -6127,8 +5532,8 @@
           </p:sp>
         </mc:Fallback>
       </mc:AlternateContent>
-      <mc:AlternateContent xmlns:mc="http://schemas.openxmlformats.org/markup-compatibility/2006">
-        <mc:Choice xmlns:a14="http://schemas.microsoft.com/office/drawing/2010/main" Requires="a14">
+      <mc:AlternateContent xmlns:mc="http://schemas.openxmlformats.org/markup-compatibility/2006" xmlns:a14="http://schemas.microsoft.com/office/drawing/2010/main">
+        <mc:Choice Requires="a14">
           <p:sp>
             <p:nvSpPr>
               <p:cNvPr id="91" name="Textfeld 90">
@@ -6157,6 +5562,7 @@
               </a:bodyPr>
               <a:lstStyle/>
               <a:p>
+                <a:pPr/>
                 <a14:m>
                   <m:oMathPara xmlns:m="http://schemas.openxmlformats.org/officeDocument/2006/math">
                     <m:oMathParaPr>
@@ -6177,7 +5583,7 @@
             </p:txBody>
           </p:sp>
         </mc:Choice>
-        <mc:Fallback>
+        <mc:Fallback xmlns="">
           <p:sp>
             <p:nvSpPr>
               <p:cNvPr id="91" name="Textfeld 90">
@@ -6201,7 +5607,7 @@
                 <a:avLst/>
               </a:prstGeom>
               <a:blipFill>
-                <a:blip r:embed="rId9"/>
+                <a:blip r:embed="rId13"/>
                 <a:stretch>
                   <a:fillRect b="-4000"/>
                 </a:stretch>
@@ -6776,6 +6182,1695 @@
           </a:fontRef>
         </p:style>
       </p:cxnSp>
+      <mc:AlternateContent xmlns:mc="http://schemas.openxmlformats.org/markup-compatibility/2006">
+        <mc:Choice xmlns:a14="http://schemas.microsoft.com/office/drawing/2010/main" Requires="a14">
+          <p:sp>
+            <p:nvSpPr>
+              <p:cNvPr id="84" name="Textfeld 83">
+                <a:extLst>
+                  <a:ext uri="{FF2B5EF4-FFF2-40B4-BE49-F238E27FC236}">
+                    <a16:creationId xmlns:a16="http://schemas.microsoft.com/office/drawing/2014/main" id="{487D086C-52B5-4428-9051-ABC62F75A32C}"/>
+                  </a:ext>
+                </a:extLst>
+              </p:cNvPr>
+              <p:cNvSpPr txBox="1"/>
+              <p:nvPr/>
+            </p:nvSpPr>
+            <p:spPr>
+              <a:xfrm>
+                <a:off x="1704350" y="3743908"/>
+                <a:ext cx="668404" cy="246221"/>
+              </a:xfrm>
+              <a:prstGeom prst="rect">
+                <a:avLst/>
+              </a:prstGeom>
+              <a:noFill/>
+            </p:spPr>
+            <p:txBody>
+              <a:bodyPr wrap="square" rtlCol="0">
+                <a:spAutoFit/>
+              </a:bodyPr>
+              <a:lstStyle/>
+              <a:p>
+                <a:r>
+                  <a:rPr lang="de-DE" sz="1000" dirty="0"/>
+                  <a:t>length </a:t>
+                </a:r>
+                <a14:m>
+                  <m:oMath xmlns:m="http://schemas.openxmlformats.org/officeDocument/2006/math">
+                    <m:r>
+                      <a:rPr lang="de-DE" sz="1000" b="0" i="1" smtClean="0">
+                        <a:latin typeface="Cambria Math" panose="02040503050406030204" pitchFamily="18" charset="0"/>
+                      </a:rPr>
+                      <m:t>𝑙</m:t>
+                    </m:r>
+                  </m:oMath>
+                </a14:m>
+                <a:r>
+                  <a:rPr lang="de-DE" sz="1000" dirty="0"/>
+                  <a:t>  </a:t>
+                </a:r>
+              </a:p>
+            </p:txBody>
+          </p:sp>
+        </mc:Choice>
+        <mc:Fallback>
+          <p:sp>
+            <p:nvSpPr>
+              <p:cNvPr id="84" name="Textfeld 83">
+                <a:extLst>
+                  <a:ext uri="{FF2B5EF4-FFF2-40B4-BE49-F238E27FC236}">
+                    <a16:creationId xmlns:a16="http://schemas.microsoft.com/office/drawing/2014/main" id="{487D086C-52B5-4428-9051-ABC62F75A32C}"/>
+                  </a:ext>
+                </a:extLst>
+              </p:cNvPr>
+              <p:cNvSpPr txBox="1">
+                <a:spLocks noRot="1" noChangeAspect="1" noMove="1" noResize="1" noEditPoints="1" noAdjustHandles="1" noChangeArrowheads="1" noChangeShapeType="1" noTextEdit="1"/>
+              </p:cNvSpPr>
+              <p:nvPr/>
+            </p:nvSpPr>
+            <p:spPr>
+              <a:xfrm>
+                <a:off x="1704350" y="3743908"/>
+                <a:ext cx="668404" cy="246221"/>
+              </a:xfrm>
+              <a:prstGeom prst="rect">
+                <a:avLst/>
+              </a:prstGeom>
+              <a:blipFill>
+                <a:blip r:embed="rId14"/>
+                <a:stretch>
+                  <a:fillRect b="-14634"/>
+                </a:stretch>
+              </a:blipFill>
+            </p:spPr>
+            <p:txBody>
+              <a:bodyPr/>
+              <a:lstStyle/>
+              <a:p>
+                <a:r>
+                  <a:rPr lang="de-DE">
+                    <a:noFill/>
+                  </a:rPr>
+                  <a:t> </a:t>
+                </a:r>
+              </a:p>
+            </p:txBody>
+          </p:sp>
+        </mc:Fallback>
+      </mc:AlternateContent>
+      <mc:AlternateContent xmlns:mc="http://schemas.openxmlformats.org/markup-compatibility/2006">
+        <mc:Choice xmlns:a14="http://schemas.microsoft.com/office/drawing/2010/main" Requires="a14">
+          <p:sp>
+            <p:nvSpPr>
+              <p:cNvPr id="95" name="Textfeld 94">
+                <a:extLst>
+                  <a:ext uri="{FF2B5EF4-FFF2-40B4-BE49-F238E27FC236}">
+                    <a16:creationId xmlns:a16="http://schemas.microsoft.com/office/drawing/2014/main" id="{E4FDA6EF-2D9D-45A6-B8FE-2FF9D713D2E5}"/>
+                  </a:ext>
+                </a:extLst>
+              </p:cNvPr>
+              <p:cNvSpPr txBox="1"/>
+              <p:nvPr/>
+            </p:nvSpPr>
+            <p:spPr>
+              <a:xfrm>
+                <a:off x="252281" y="3244006"/>
+                <a:ext cx="654857" cy="246221"/>
+              </a:xfrm>
+              <a:prstGeom prst="rect">
+                <a:avLst/>
+              </a:prstGeom>
+              <a:noFill/>
+            </p:spPr>
+            <p:txBody>
+              <a:bodyPr wrap="square" rtlCol="0">
+                <a:spAutoFit/>
+              </a:bodyPr>
+              <a:lstStyle/>
+              <a:p>
+                <a:r>
+                  <a:rPr lang="de-DE" sz="1000" dirty="0"/>
+                  <a:t>height </a:t>
+                </a:r>
+                <a14:m>
+                  <m:oMath xmlns:m="http://schemas.openxmlformats.org/officeDocument/2006/math">
+                    <m:r>
+                      <a:rPr lang="de-DE" sz="1000" b="0" i="1" dirty="0" smtClean="0">
+                        <a:latin typeface="Cambria Math" panose="02040503050406030204" pitchFamily="18" charset="0"/>
+                      </a:rPr>
+                      <m:t>h</m:t>
+                    </m:r>
+                  </m:oMath>
+                </a14:m>
+                <a:endParaRPr lang="de-DE" sz="1000" dirty="0"/>
+              </a:p>
+            </p:txBody>
+          </p:sp>
+        </mc:Choice>
+        <mc:Fallback>
+          <p:sp>
+            <p:nvSpPr>
+              <p:cNvPr id="95" name="Textfeld 94">
+                <a:extLst>
+                  <a:ext uri="{FF2B5EF4-FFF2-40B4-BE49-F238E27FC236}">
+                    <a16:creationId xmlns:a16="http://schemas.microsoft.com/office/drawing/2014/main" id="{E4FDA6EF-2D9D-45A6-B8FE-2FF9D713D2E5}"/>
+                  </a:ext>
+                </a:extLst>
+              </p:cNvPr>
+              <p:cNvSpPr txBox="1">
+                <a:spLocks noRot="1" noChangeAspect="1" noMove="1" noResize="1" noEditPoints="1" noAdjustHandles="1" noChangeArrowheads="1" noChangeShapeType="1" noTextEdit="1"/>
+              </p:cNvSpPr>
+              <p:nvPr/>
+            </p:nvSpPr>
+            <p:spPr>
+              <a:xfrm>
+                <a:off x="252281" y="3244006"/>
+                <a:ext cx="654857" cy="246221"/>
+              </a:xfrm>
+              <a:prstGeom prst="rect">
+                <a:avLst/>
+              </a:prstGeom>
+              <a:blipFill>
+                <a:blip r:embed="rId15"/>
+                <a:stretch>
+                  <a:fillRect b="-14634"/>
+                </a:stretch>
+              </a:blipFill>
+            </p:spPr>
+            <p:txBody>
+              <a:bodyPr/>
+              <a:lstStyle/>
+              <a:p>
+                <a:r>
+                  <a:rPr lang="de-DE">
+                    <a:noFill/>
+                  </a:rPr>
+                  <a:t> </a:t>
+                </a:r>
+              </a:p>
+            </p:txBody>
+          </p:sp>
+        </mc:Fallback>
+      </mc:AlternateContent>
+      <mc:AlternateContent xmlns:mc="http://schemas.openxmlformats.org/markup-compatibility/2006">
+        <mc:Choice xmlns:a14="http://schemas.microsoft.com/office/drawing/2010/main" Requires="a14">
+          <p:sp>
+            <p:nvSpPr>
+              <p:cNvPr id="96" name="Textfeld 95">
+                <a:extLst>
+                  <a:ext uri="{FF2B5EF4-FFF2-40B4-BE49-F238E27FC236}">
+                    <a16:creationId xmlns:a16="http://schemas.microsoft.com/office/drawing/2014/main" id="{34BA49B0-2D85-4606-970B-006B32EBC569}"/>
+                  </a:ext>
+                </a:extLst>
+              </p:cNvPr>
+              <p:cNvSpPr txBox="1"/>
+              <p:nvPr/>
+            </p:nvSpPr>
+            <p:spPr>
+              <a:xfrm>
+                <a:off x="449277" y="3638825"/>
+                <a:ext cx="649745" cy="246221"/>
+              </a:xfrm>
+              <a:prstGeom prst="rect">
+                <a:avLst/>
+              </a:prstGeom>
+              <a:noFill/>
+            </p:spPr>
+            <p:txBody>
+              <a:bodyPr wrap="square" rtlCol="0">
+                <a:spAutoFit/>
+              </a:bodyPr>
+              <a:lstStyle/>
+              <a:p>
+                <a:r>
+                  <a:rPr lang="de-DE" sz="1000" dirty="0"/>
+                  <a:t>width </a:t>
+                </a:r>
+                <a14:m>
+                  <m:oMath xmlns:m="http://schemas.openxmlformats.org/officeDocument/2006/math">
+                    <m:r>
+                      <a:rPr lang="de-DE" sz="1000" b="0" i="1" smtClean="0">
+                        <a:latin typeface="Cambria Math" panose="02040503050406030204" pitchFamily="18" charset="0"/>
+                      </a:rPr>
+                      <m:t>𝑤</m:t>
+                    </m:r>
+                  </m:oMath>
+                </a14:m>
+                <a:endParaRPr lang="de-DE" sz="1000" dirty="0"/>
+              </a:p>
+            </p:txBody>
+          </p:sp>
+        </mc:Choice>
+        <mc:Fallback>
+          <p:sp>
+            <p:nvSpPr>
+              <p:cNvPr id="96" name="Textfeld 95">
+                <a:extLst>
+                  <a:ext uri="{FF2B5EF4-FFF2-40B4-BE49-F238E27FC236}">
+                    <a16:creationId xmlns:a16="http://schemas.microsoft.com/office/drawing/2014/main" id="{34BA49B0-2D85-4606-970B-006B32EBC569}"/>
+                  </a:ext>
+                </a:extLst>
+              </p:cNvPr>
+              <p:cNvSpPr txBox="1">
+                <a:spLocks noRot="1" noChangeAspect="1" noMove="1" noResize="1" noEditPoints="1" noAdjustHandles="1" noChangeArrowheads="1" noChangeShapeType="1" noTextEdit="1"/>
+              </p:cNvSpPr>
+              <p:nvPr/>
+            </p:nvSpPr>
+            <p:spPr>
+              <a:xfrm>
+                <a:off x="449277" y="3638825"/>
+                <a:ext cx="649745" cy="246221"/>
+              </a:xfrm>
+              <a:prstGeom prst="rect">
+                <a:avLst/>
+              </a:prstGeom>
+              <a:blipFill>
+                <a:blip r:embed="rId16"/>
+                <a:stretch>
+                  <a:fillRect b="-15000"/>
+                </a:stretch>
+              </a:blipFill>
+            </p:spPr>
+            <p:txBody>
+              <a:bodyPr/>
+              <a:lstStyle/>
+              <a:p>
+                <a:r>
+                  <a:rPr lang="de-DE">
+                    <a:noFill/>
+                  </a:rPr>
+                  <a:t> </a:t>
+                </a:r>
+              </a:p>
+            </p:txBody>
+          </p:sp>
+        </mc:Fallback>
+      </mc:AlternateContent>
+      <p:cxnSp>
+        <p:nvCxnSpPr>
+          <p:cNvPr id="97" name="Gerade Verbindung mit Pfeil 96">
+            <a:extLst>
+              <a:ext uri="{FF2B5EF4-FFF2-40B4-BE49-F238E27FC236}">
+                <a16:creationId xmlns:a16="http://schemas.microsoft.com/office/drawing/2014/main" id="{50F8FB91-549B-40C9-8341-95BD005A5C8B}"/>
+              </a:ext>
+            </a:extLst>
+          </p:cNvPr>
+          <p:cNvCxnSpPr>
+            <a:cxnSpLocks/>
+          </p:cNvCxnSpPr>
+          <p:nvPr/>
+        </p:nvCxnSpPr>
+        <p:spPr>
+          <a:xfrm flipH="1">
+            <a:off x="1344242" y="3663839"/>
+            <a:ext cx="1163214" cy="173566"/>
+          </a:xfrm>
+          <a:prstGeom prst="straightConnector1">
+            <a:avLst/>
+          </a:prstGeom>
+          <a:ln w="9525">
+            <a:solidFill>
+              <a:schemeClr val="tx1">
+                <a:lumMod val="85000"/>
+                <a:lumOff val="15000"/>
+              </a:schemeClr>
+            </a:solidFill>
+            <a:prstDash val="sysDash"/>
+            <a:headEnd type="triangle" w="sm" len="sm"/>
+            <a:tailEnd type="triangle" w="sm" len="sm"/>
+          </a:ln>
+        </p:spPr>
+        <p:style>
+          <a:lnRef idx="1">
+            <a:schemeClr val="accent1"/>
+          </a:lnRef>
+          <a:fillRef idx="0">
+            <a:schemeClr val="accent1"/>
+          </a:fillRef>
+          <a:effectRef idx="0">
+            <a:schemeClr val="accent1"/>
+          </a:effectRef>
+          <a:fontRef idx="minor">
+            <a:schemeClr val="tx1"/>
+          </a:fontRef>
+        </p:style>
+      </p:cxnSp>
+      <p:cxnSp>
+        <p:nvCxnSpPr>
+          <p:cNvPr id="98" name="Gerade Verbindung mit Pfeil 97">
+            <a:extLst>
+              <a:ext uri="{FF2B5EF4-FFF2-40B4-BE49-F238E27FC236}">
+                <a16:creationId xmlns:a16="http://schemas.microsoft.com/office/drawing/2014/main" id="{0D5F779E-4713-4D0A-AB90-4977DA8DC096}"/>
+              </a:ext>
+            </a:extLst>
+          </p:cNvPr>
+          <p:cNvCxnSpPr>
+            <a:cxnSpLocks/>
+          </p:cNvCxnSpPr>
+          <p:nvPr/>
+        </p:nvCxnSpPr>
+        <p:spPr>
+          <a:xfrm>
+            <a:off x="860425" y="3598029"/>
+            <a:ext cx="343015" cy="212562"/>
+          </a:xfrm>
+          <a:prstGeom prst="straightConnector1">
+            <a:avLst/>
+          </a:prstGeom>
+          <a:ln w="9525">
+            <a:solidFill>
+              <a:schemeClr val="tx1">
+                <a:lumMod val="85000"/>
+                <a:lumOff val="15000"/>
+              </a:schemeClr>
+            </a:solidFill>
+            <a:prstDash val="sysDash"/>
+            <a:headEnd type="triangle" w="sm" len="sm"/>
+            <a:tailEnd type="triangle" w="sm" len="sm"/>
+          </a:ln>
+        </p:spPr>
+        <p:style>
+          <a:lnRef idx="1">
+            <a:schemeClr val="accent1"/>
+          </a:lnRef>
+          <a:fillRef idx="0">
+            <a:schemeClr val="accent1"/>
+          </a:fillRef>
+          <a:effectRef idx="0">
+            <a:schemeClr val="accent1"/>
+          </a:effectRef>
+          <a:fontRef idx="minor">
+            <a:schemeClr val="tx1"/>
+          </a:fontRef>
+        </p:style>
+      </p:cxnSp>
+      <p:cxnSp>
+        <p:nvCxnSpPr>
+          <p:cNvPr id="100" name="Gerade Verbindung mit Pfeil 99">
+            <a:extLst>
+              <a:ext uri="{FF2B5EF4-FFF2-40B4-BE49-F238E27FC236}">
+                <a16:creationId xmlns:a16="http://schemas.microsoft.com/office/drawing/2014/main" id="{B9EC778E-3352-436C-B188-42866A6B2CAC}"/>
+              </a:ext>
+            </a:extLst>
+          </p:cNvPr>
+          <p:cNvCxnSpPr>
+            <a:cxnSpLocks/>
+          </p:cNvCxnSpPr>
+          <p:nvPr/>
+        </p:nvCxnSpPr>
+        <p:spPr>
+          <a:xfrm flipV="1">
+            <a:off x="853181" y="3040887"/>
+            <a:ext cx="0" cy="514486"/>
+          </a:xfrm>
+          <a:prstGeom prst="straightConnector1">
+            <a:avLst/>
+          </a:prstGeom>
+          <a:ln w="9525">
+            <a:solidFill>
+              <a:schemeClr val="tx1">
+                <a:lumMod val="85000"/>
+                <a:lumOff val="15000"/>
+              </a:schemeClr>
+            </a:solidFill>
+            <a:prstDash val="sysDash"/>
+            <a:headEnd type="triangle" w="sm" len="sm"/>
+            <a:tailEnd type="triangle" w="sm" len="sm"/>
+          </a:ln>
+        </p:spPr>
+        <p:style>
+          <a:lnRef idx="1">
+            <a:schemeClr val="accent1"/>
+          </a:lnRef>
+          <a:fillRef idx="0">
+            <a:schemeClr val="accent1"/>
+          </a:fillRef>
+          <a:effectRef idx="0">
+            <a:schemeClr val="accent1"/>
+          </a:effectRef>
+          <a:fontRef idx="minor">
+            <a:schemeClr val="tx1"/>
+          </a:fontRef>
+        </p:style>
+      </p:cxnSp>
+      <p:cxnSp>
+        <p:nvCxnSpPr>
+          <p:cNvPr id="28" name="Gerader Verbinder 27">
+            <a:extLst>
+              <a:ext uri="{FF2B5EF4-FFF2-40B4-BE49-F238E27FC236}">
+                <a16:creationId xmlns:a16="http://schemas.microsoft.com/office/drawing/2014/main" id="{1A133499-7F4D-401D-ACDD-9D4E2E8EE369}"/>
+              </a:ext>
+            </a:extLst>
+          </p:cNvPr>
+          <p:cNvCxnSpPr>
+            <a:cxnSpLocks/>
+          </p:cNvCxnSpPr>
+          <p:nvPr/>
+        </p:nvCxnSpPr>
+        <p:spPr>
+          <a:xfrm flipH="1" flipV="1">
+            <a:off x="1671304" y="3574093"/>
+            <a:ext cx="183127" cy="102336"/>
+          </a:xfrm>
+          <a:prstGeom prst="line">
+            <a:avLst/>
+          </a:prstGeom>
+          <a:ln>
+            <a:solidFill>
+              <a:srgbClr val="262626"/>
+            </a:solidFill>
+            <a:prstDash val="sysDot"/>
+          </a:ln>
+        </p:spPr>
+        <p:style>
+          <a:lnRef idx="1">
+            <a:schemeClr val="accent1"/>
+          </a:lnRef>
+          <a:fillRef idx="0">
+            <a:schemeClr val="accent1"/>
+          </a:fillRef>
+          <a:effectRef idx="0">
+            <a:schemeClr val="accent1"/>
+          </a:effectRef>
+          <a:fontRef idx="minor">
+            <a:schemeClr val="tx1"/>
+          </a:fontRef>
+        </p:style>
+      </p:cxnSp>
+      <p:cxnSp>
+        <p:nvCxnSpPr>
+          <p:cNvPr id="106" name="Gerader Verbinder 105">
+            <a:extLst>
+              <a:ext uri="{FF2B5EF4-FFF2-40B4-BE49-F238E27FC236}">
+                <a16:creationId xmlns:a16="http://schemas.microsoft.com/office/drawing/2014/main" id="{50C0D412-05BD-4B31-982C-EED9D5569CF8}"/>
+              </a:ext>
+            </a:extLst>
+          </p:cNvPr>
+          <p:cNvCxnSpPr>
+            <a:cxnSpLocks/>
+          </p:cNvCxnSpPr>
+          <p:nvPr/>
+        </p:nvCxnSpPr>
+        <p:spPr>
+          <a:xfrm flipH="1">
+            <a:off x="1112156" y="3572671"/>
+            <a:ext cx="558765" cy="91168"/>
+          </a:xfrm>
+          <a:prstGeom prst="line">
+            <a:avLst/>
+          </a:prstGeom>
+          <a:ln>
+            <a:solidFill>
+              <a:srgbClr val="262626"/>
+            </a:solidFill>
+            <a:prstDash val="sysDot"/>
+          </a:ln>
+        </p:spPr>
+        <p:style>
+          <a:lnRef idx="1">
+            <a:schemeClr val="accent1"/>
+          </a:lnRef>
+          <a:fillRef idx="0">
+            <a:schemeClr val="accent1"/>
+          </a:fillRef>
+          <a:effectRef idx="0">
+            <a:schemeClr val="accent1"/>
+          </a:effectRef>
+          <a:fontRef idx="minor">
+            <a:schemeClr val="tx1"/>
+          </a:fontRef>
+        </p:style>
+      </p:cxnSp>
+      <p:cxnSp>
+        <p:nvCxnSpPr>
+          <p:cNvPr id="107" name="Gerader Verbinder 106">
+            <a:extLst>
+              <a:ext uri="{FF2B5EF4-FFF2-40B4-BE49-F238E27FC236}">
+                <a16:creationId xmlns:a16="http://schemas.microsoft.com/office/drawing/2014/main" id="{3DEF293A-18F2-4667-AD57-40005353CB6C}"/>
+              </a:ext>
+            </a:extLst>
+          </p:cNvPr>
+          <p:cNvCxnSpPr>
+            <a:cxnSpLocks/>
+          </p:cNvCxnSpPr>
+          <p:nvPr/>
+        </p:nvCxnSpPr>
+        <p:spPr>
+          <a:xfrm flipV="1">
+            <a:off x="1670920" y="3335184"/>
+            <a:ext cx="0" cy="237487"/>
+          </a:xfrm>
+          <a:prstGeom prst="line">
+            <a:avLst/>
+          </a:prstGeom>
+          <a:ln>
+            <a:solidFill>
+              <a:srgbClr val="262626"/>
+            </a:solidFill>
+            <a:prstDash val="sysDot"/>
+          </a:ln>
+        </p:spPr>
+        <p:style>
+          <a:lnRef idx="1">
+            <a:schemeClr val="accent1"/>
+          </a:lnRef>
+          <a:fillRef idx="0">
+            <a:schemeClr val="accent1"/>
+          </a:fillRef>
+          <a:effectRef idx="0">
+            <a:schemeClr val="accent1"/>
+          </a:effectRef>
+          <a:fontRef idx="minor">
+            <a:schemeClr val="tx1"/>
+          </a:fontRef>
+        </p:style>
+      </p:cxnSp>
+      <p:grpSp>
+        <p:nvGrpSpPr>
+          <p:cNvPr id="56" name="Gruppieren 55">
+            <a:extLst>
+              <a:ext uri="{FF2B5EF4-FFF2-40B4-BE49-F238E27FC236}">
+                <a16:creationId xmlns:a16="http://schemas.microsoft.com/office/drawing/2014/main" id="{99E5451A-4594-485A-B228-45AE12D1A562}"/>
+              </a:ext>
+            </a:extLst>
+          </p:cNvPr>
+          <p:cNvGrpSpPr/>
+          <p:nvPr/>
+        </p:nvGrpSpPr>
+        <p:grpSpPr>
+          <a:xfrm>
+            <a:off x="1141050" y="2698109"/>
+            <a:ext cx="1142267" cy="711873"/>
+            <a:chOff x="1141050" y="2698109"/>
+            <a:chExt cx="1142267" cy="711873"/>
+          </a:xfrm>
+        </p:grpSpPr>
+        <p:cxnSp>
+          <p:nvCxnSpPr>
+            <p:cNvPr id="12" name="Gerade Verbindung mit Pfeil 11">
+              <a:extLst>
+                <a:ext uri="{FF2B5EF4-FFF2-40B4-BE49-F238E27FC236}">
+                  <a16:creationId xmlns:a16="http://schemas.microsoft.com/office/drawing/2014/main" id="{EDE78D3D-4F93-483B-A1C3-E403633D72EC}"/>
+                </a:ext>
+              </a:extLst>
+            </p:cNvPr>
+            <p:cNvCxnSpPr>
+              <a:cxnSpLocks/>
+            </p:cNvCxnSpPr>
+            <p:nvPr/>
+          </p:nvCxnSpPr>
+          <p:spPr>
+            <a:xfrm flipV="1">
+              <a:off x="1670206" y="3267019"/>
+              <a:ext cx="417563" cy="60325"/>
+            </a:xfrm>
+            <a:prstGeom prst="straightConnector1">
+              <a:avLst/>
+            </a:prstGeom>
+            <a:ln w="12700">
+              <a:solidFill>
+                <a:schemeClr val="tx1">
+                  <a:lumMod val="85000"/>
+                  <a:lumOff val="15000"/>
+                </a:schemeClr>
+              </a:solidFill>
+              <a:tailEnd type="triangle" w="sm" len="lg"/>
+            </a:ln>
+          </p:spPr>
+          <p:style>
+            <a:lnRef idx="1">
+              <a:schemeClr val="accent1"/>
+            </a:lnRef>
+            <a:fillRef idx="0">
+              <a:schemeClr val="accent1"/>
+            </a:fillRef>
+            <a:effectRef idx="0">
+              <a:schemeClr val="accent1"/>
+            </a:effectRef>
+            <a:fontRef idx="minor">
+              <a:schemeClr val="tx1"/>
+            </a:fontRef>
+          </p:style>
+        </p:cxnSp>
+        <p:cxnSp>
+          <p:nvCxnSpPr>
+            <p:cNvPr id="13" name="Gerade Verbindung mit Pfeil 12">
+              <a:extLst>
+                <a:ext uri="{FF2B5EF4-FFF2-40B4-BE49-F238E27FC236}">
+                  <a16:creationId xmlns:a16="http://schemas.microsoft.com/office/drawing/2014/main" id="{A935FC01-3AFB-47EB-AD77-A9FB9543F898}"/>
+                </a:ext>
+              </a:extLst>
+            </p:cNvPr>
+            <p:cNvCxnSpPr>
+              <a:cxnSpLocks/>
+            </p:cNvCxnSpPr>
+            <p:nvPr/>
+          </p:nvCxnSpPr>
+          <p:spPr>
+            <a:xfrm flipV="1">
+              <a:off x="1670206" y="2854269"/>
+              <a:ext cx="0" cy="473075"/>
+            </a:xfrm>
+            <a:prstGeom prst="straightConnector1">
+              <a:avLst/>
+            </a:prstGeom>
+            <a:ln w="12700">
+              <a:solidFill>
+                <a:schemeClr val="tx1">
+                  <a:lumMod val="85000"/>
+                  <a:lumOff val="15000"/>
+                </a:schemeClr>
+              </a:solidFill>
+              <a:tailEnd type="triangle" w="sm" len="lg"/>
+            </a:ln>
+          </p:spPr>
+          <p:style>
+            <a:lnRef idx="1">
+              <a:schemeClr val="accent1"/>
+            </a:lnRef>
+            <a:fillRef idx="0">
+              <a:schemeClr val="accent1"/>
+            </a:fillRef>
+            <a:effectRef idx="0">
+              <a:schemeClr val="accent1"/>
+            </a:effectRef>
+            <a:fontRef idx="minor">
+              <a:schemeClr val="tx1"/>
+            </a:fontRef>
+          </p:style>
+        </p:cxnSp>
+        <p:cxnSp>
+          <p:nvCxnSpPr>
+            <p:cNvPr id="16" name="Gerade Verbindung mit Pfeil 15">
+              <a:extLst>
+                <a:ext uri="{FF2B5EF4-FFF2-40B4-BE49-F238E27FC236}">
+                  <a16:creationId xmlns:a16="http://schemas.microsoft.com/office/drawing/2014/main" id="{0191FBAA-606F-4F3A-A142-ED3B6FAD3C65}"/>
+                </a:ext>
+              </a:extLst>
+            </p:cNvPr>
+            <p:cNvCxnSpPr>
+              <a:cxnSpLocks/>
+            </p:cNvCxnSpPr>
+            <p:nvPr/>
+          </p:nvCxnSpPr>
+          <p:spPr>
+            <a:xfrm flipH="1" flipV="1">
+              <a:off x="1374930" y="3136844"/>
+              <a:ext cx="295275" cy="190500"/>
+            </a:xfrm>
+            <a:prstGeom prst="straightConnector1">
+              <a:avLst/>
+            </a:prstGeom>
+            <a:ln w="12700">
+              <a:solidFill>
+                <a:schemeClr val="tx1">
+                  <a:lumMod val="85000"/>
+                  <a:lumOff val="15000"/>
+                </a:schemeClr>
+              </a:solidFill>
+              <a:tailEnd type="triangle" w="sm" len="lg"/>
+            </a:ln>
+          </p:spPr>
+          <p:style>
+            <a:lnRef idx="1">
+              <a:schemeClr val="accent1"/>
+            </a:lnRef>
+            <a:fillRef idx="0">
+              <a:schemeClr val="accent1"/>
+            </a:fillRef>
+            <a:effectRef idx="0">
+              <a:schemeClr val="accent1"/>
+            </a:effectRef>
+            <a:fontRef idx="minor">
+              <a:schemeClr val="tx1"/>
+            </a:fontRef>
+          </p:style>
+        </p:cxnSp>
+        <mc:AlternateContent xmlns:mc="http://schemas.openxmlformats.org/markup-compatibility/2006">
+          <mc:Choice xmlns:a14="http://schemas.microsoft.com/office/drawing/2010/main" Requires="a14">
+            <p:sp>
+              <p:nvSpPr>
+                <p:cNvPr id="20" name="Textfeld 19">
+                  <a:extLst>
+                    <a:ext uri="{FF2B5EF4-FFF2-40B4-BE49-F238E27FC236}">
+                      <a16:creationId xmlns:a16="http://schemas.microsoft.com/office/drawing/2014/main" id="{2802209C-1AD8-4823-B27E-CFFAD01F1DDF}"/>
+                    </a:ext>
+                  </a:extLst>
+                </p:cNvPr>
+                <p:cNvSpPr txBox="1"/>
+                <p:nvPr/>
+              </p:nvSpPr>
+              <p:spPr>
+                <a:xfrm>
+                  <a:off x="1141050" y="3033440"/>
+                  <a:ext cx="333369" cy="153888"/>
+                </a:xfrm>
+                <a:prstGeom prst="rect">
+                  <a:avLst/>
+                </a:prstGeom>
+                <a:noFill/>
+              </p:spPr>
+              <p:txBody>
+                <a:bodyPr wrap="square" lIns="0" tIns="0" rIns="0" bIns="0" rtlCol="0">
+                  <a:spAutoFit/>
+                </a:bodyPr>
+                <a:lstStyle/>
+                <a:p>
+                  <a:pPr/>
+                  <a14:m>
+                    <m:oMathPara xmlns:m="http://schemas.openxmlformats.org/officeDocument/2006/math">
+                      <m:oMathParaPr>
+                        <m:jc m:val="centerGroup"/>
+                      </m:oMathParaPr>
+                      <m:oMath xmlns:m="http://schemas.openxmlformats.org/officeDocument/2006/math">
+                        <m:r>
+                          <a:rPr lang="de-DE" sz="1000" b="0" i="1" dirty="0" smtClean="0">
+                            <a:latin typeface="Cambria Math" panose="02040503050406030204" pitchFamily="18" charset="0"/>
+                          </a:rPr>
+                          <m:t>𝑦</m:t>
+                        </m:r>
+                      </m:oMath>
+                    </m:oMathPara>
+                  </a14:m>
+                  <a:endParaRPr lang="de-DE" sz="1000" dirty="0"/>
+                </a:p>
+              </p:txBody>
+            </p:sp>
+          </mc:Choice>
+          <mc:Fallback>
+            <p:sp>
+              <p:nvSpPr>
+                <p:cNvPr id="20" name="Textfeld 19">
+                  <a:extLst>
+                    <a:ext uri="{FF2B5EF4-FFF2-40B4-BE49-F238E27FC236}">
+                      <a16:creationId xmlns:a16="http://schemas.microsoft.com/office/drawing/2014/main" id="{2802209C-1AD8-4823-B27E-CFFAD01F1DDF}"/>
+                    </a:ext>
+                  </a:extLst>
+                </p:cNvPr>
+                <p:cNvSpPr txBox="1">
+                  <a:spLocks noRot="1" noChangeAspect="1" noMove="1" noResize="1" noEditPoints="1" noAdjustHandles="1" noChangeArrowheads="1" noChangeShapeType="1" noTextEdit="1"/>
+                </p:cNvSpPr>
+                <p:nvPr/>
+              </p:nvSpPr>
+              <p:spPr>
+                <a:xfrm>
+                  <a:off x="1141050" y="3033440"/>
+                  <a:ext cx="333369" cy="153888"/>
+                </a:xfrm>
+                <a:prstGeom prst="rect">
+                  <a:avLst/>
+                </a:prstGeom>
+                <a:blipFill>
+                  <a:blip r:embed="rId17"/>
+                  <a:stretch>
+                    <a:fillRect b="-24000"/>
+                  </a:stretch>
+                </a:blipFill>
+              </p:spPr>
+              <p:txBody>
+                <a:bodyPr/>
+                <a:lstStyle/>
+                <a:p>
+                  <a:r>
+                    <a:rPr lang="de-DE">
+                      <a:noFill/>
+                    </a:rPr>
+                    <a:t> </a:t>
+                  </a:r>
+                </a:p>
+              </p:txBody>
+            </p:sp>
+          </mc:Fallback>
+        </mc:AlternateContent>
+        <p:sp>
+          <p:nvSpPr>
+            <p:cNvPr id="22" name="Ellipse 21">
+              <a:extLst>
+                <a:ext uri="{FF2B5EF4-FFF2-40B4-BE49-F238E27FC236}">
+                  <a16:creationId xmlns:a16="http://schemas.microsoft.com/office/drawing/2014/main" id="{61E5ACAB-0A7E-4B63-9041-A2CCEEBEFC42}"/>
+                </a:ext>
+              </a:extLst>
+            </p:cNvPr>
+            <p:cNvSpPr/>
+            <p:nvPr/>
+          </p:nvSpPr>
+          <p:spPr>
+            <a:xfrm>
+              <a:off x="1639838" y="3267019"/>
+              <a:ext cx="60736" cy="60736"/>
+            </a:xfrm>
+            <a:prstGeom prst="ellipse">
+              <a:avLst/>
+            </a:prstGeom>
+            <a:solidFill>
+              <a:schemeClr val="tx1">
+                <a:lumMod val="85000"/>
+                <a:lumOff val="15000"/>
+              </a:schemeClr>
+            </a:solidFill>
+            <a:ln>
+              <a:noFill/>
+            </a:ln>
+            <a:effectLst/>
+            <a:scene3d>
+              <a:camera prst="isometricOffAxis1Top"/>
+              <a:lightRig rig="threePt" dir="t"/>
+            </a:scene3d>
+            <a:sp3d>
+              <a:bevelT w="30480" h="30480"/>
+              <a:bevelB w="30480" h="30480"/>
+            </a:sp3d>
+          </p:spPr>
+          <p:style>
+            <a:lnRef idx="2">
+              <a:schemeClr val="accent1">
+                <a:shade val="50000"/>
+              </a:schemeClr>
+            </a:lnRef>
+            <a:fillRef idx="1">
+              <a:schemeClr val="accent1"/>
+            </a:fillRef>
+            <a:effectRef idx="0">
+              <a:schemeClr val="accent1"/>
+            </a:effectRef>
+            <a:fontRef idx="minor">
+              <a:schemeClr val="lt1"/>
+            </a:fontRef>
+          </p:style>
+          <p:txBody>
+            <a:bodyPr rot="0" spcFirstLastPara="0" vertOverflow="overflow" horzOverflow="overflow" vert="horz" wrap="square" lIns="91440" tIns="45720" rIns="91440" bIns="45720" numCol="1" spcCol="0" rtlCol="0" fromWordArt="0" anchor="ctr" anchorCtr="0" forceAA="0" compatLnSpc="1">
+              <a:prstTxWarp prst="textNoShape">
+                <a:avLst/>
+              </a:prstTxWarp>
+              <a:noAutofit/>
+            </a:bodyPr>
+            <a:lstStyle/>
+            <a:p>
+              <a:pPr algn="ctr"/>
+              <a:endParaRPr lang="de-DE"/>
+            </a:p>
+          </p:txBody>
+        </p:sp>
+        <mc:AlternateContent xmlns:mc="http://schemas.openxmlformats.org/markup-compatibility/2006">
+          <mc:Choice xmlns:a14="http://schemas.microsoft.com/office/drawing/2010/main" Requires="a14">
+            <p:sp>
+              <p:nvSpPr>
+                <p:cNvPr id="23" name="Textfeld 22">
+                  <a:extLst>
+                    <a:ext uri="{FF2B5EF4-FFF2-40B4-BE49-F238E27FC236}">
+                      <a16:creationId xmlns:a16="http://schemas.microsoft.com/office/drawing/2014/main" id="{532379D3-D776-4EC3-9B88-11D8612F6E83}"/>
+                    </a:ext>
+                  </a:extLst>
+                </p:cNvPr>
+                <p:cNvSpPr txBox="1"/>
+                <p:nvPr/>
+              </p:nvSpPr>
+              <p:spPr>
+                <a:xfrm>
+                  <a:off x="1949948" y="3256094"/>
+                  <a:ext cx="333369" cy="153888"/>
+                </a:xfrm>
+                <a:prstGeom prst="rect">
+                  <a:avLst/>
+                </a:prstGeom>
+                <a:noFill/>
+              </p:spPr>
+              <p:txBody>
+                <a:bodyPr wrap="square" lIns="0" tIns="0" rIns="0" bIns="0" rtlCol="0">
+                  <a:spAutoFit/>
+                </a:bodyPr>
+                <a:lstStyle/>
+                <a:p>
+                  <a:pPr/>
+                  <a14:m>
+                    <m:oMathPara xmlns:m="http://schemas.openxmlformats.org/officeDocument/2006/math">
+                      <m:oMathParaPr>
+                        <m:jc m:val="centerGroup"/>
+                      </m:oMathParaPr>
+                      <m:oMath xmlns:m="http://schemas.openxmlformats.org/officeDocument/2006/math">
+                        <m:r>
+                          <a:rPr lang="de-DE" sz="1000" b="0" i="1" dirty="0" smtClean="0">
+                            <a:latin typeface="Cambria Math" panose="02040503050406030204" pitchFamily="18" charset="0"/>
+                          </a:rPr>
+                          <m:t>𝑥</m:t>
+                        </m:r>
+                      </m:oMath>
+                    </m:oMathPara>
+                  </a14:m>
+                  <a:endParaRPr lang="de-DE" sz="1000" dirty="0"/>
+                </a:p>
+              </p:txBody>
+            </p:sp>
+          </mc:Choice>
+          <mc:Fallback>
+            <p:sp>
+              <p:nvSpPr>
+                <p:cNvPr id="23" name="Textfeld 22">
+                  <a:extLst>
+                    <a:ext uri="{FF2B5EF4-FFF2-40B4-BE49-F238E27FC236}">
+                      <a16:creationId xmlns:a16="http://schemas.microsoft.com/office/drawing/2014/main" id="{532379D3-D776-4EC3-9B88-11D8612F6E83}"/>
+                    </a:ext>
+                  </a:extLst>
+                </p:cNvPr>
+                <p:cNvSpPr txBox="1">
+                  <a:spLocks noRot="1" noChangeAspect="1" noMove="1" noResize="1" noEditPoints="1" noAdjustHandles="1" noChangeArrowheads="1" noChangeShapeType="1" noTextEdit="1"/>
+                </p:cNvSpPr>
+                <p:nvPr/>
+              </p:nvSpPr>
+              <p:spPr>
+                <a:xfrm>
+                  <a:off x="1949948" y="3256094"/>
+                  <a:ext cx="333369" cy="153888"/>
+                </a:xfrm>
+                <a:prstGeom prst="rect">
+                  <a:avLst/>
+                </a:prstGeom>
+                <a:blipFill>
+                  <a:blip r:embed="rId18"/>
+                  <a:stretch>
+                    <a:fillRect b="-4000"/>
+                  </a:stretch>
+                </a:blipFill>
+              </p:spPr>
+              <p:txBody>
+                <a:bodyPr/>
+                <a:lstStyle/>
+                <a:p>
+                  <a:r>
+                    <a:rPr lang="de-DE">
+                      <a:noFill/>
+                    </a:rPr>
+                    <a:t> </a:t>
+                  </a:r>
+                </a:p>
+              </p:txBody>
+            </p:sp>
+          </mc:Fallback>
+        </mc:AlternateContent>
+        <mc:AlternateContent xmlns:mc="http://schemas.openxmlformats.org/markup-compatibility/2006">
+          <mc:Choice xmlns:a14="http://schemas.microsoft.com/office/drawing/2010/main" Requires="a14">
+            <p:sp>
+              <p:nvSpPr>
+                <p:cNvPr id="24" name="Textfeld 23">
+                  <a:extLst>
+                    <a:ext uri="{FF2B5EF4-FFF2-40B4-BE49-F238E27FC236}">
+                      <a16:creationId xmlns:a16="http://schemas.microsoft.com/office/drawing/2014/main" id="{B0953C6D-1B61-4364-93CB-ACDEE50C1FA8}"/>
+                    </a:ext>
+                  </a:extLst>
+                </p:cNvPr>
+                <p:cNvSpPr txBox="1"/>
+                <p:nvPr/>
+              </p:nvSpPr>
+              <p:spPr>
+                <a:xfrm>
+                  <a:off x="1608327" y="2698109"/>
+                  <a:ext cx="333369" cy="153888"/>
+                </a:xfrm>
+                <a:prstGeom prst="rect">
+                  <a:avLst/>
+                </a:prstGeom>
+                <a:noFill/>
+              </p:spPr>
+              <p:txBody>
+                <a:bodyPr wrap="square" lIns="0" tIns="0" rIns="0" bIns="0" rtlCol="0">
+                  <a:spAutoFit/>
+                </a:bodyPr>
+                <a:lstStyle/>
+                <a:p>
+                  <a:pPr/>
+                  <a14:m>
+                    <m:oMathPara xmlns:m="http://schemas.openxmlformats.org/officeDocument/2006/math">
+                      <m:oMathParaPr>
+                        <m:jc m:val="centerGroup"/>
+                      </m:oMathParaPr>
+                      <m:oMath xmlns:m="http://schemas.openxmlformats.org/officeDocument/2006/math">
+                        <m:r>
+                          <a:rPr lang="de-DE" sz="1000" b="0" i="1" dirty="0" smtClean="0">
+                            <a:latin typeface="Cambria Math" panose="02040503050406030204" pitchFamily="18" charset="0"/>
+                          </a:rPr>
+                          <m:t>𝑧</m:t>
+                        </m:r>
+                      </m:oMath>
+                    </m:oMathPara>
+                  </a14:m>
+                  <a:endParaRPr lang="de-DE" sz="1000" dirty="0"/>
+                </a:p>
+              </p:txBody>
+            </p:sp>
+          </mc:Choice>
+          <mc:Fallback>
+            <p:sp>
+              <p:nvSpPr>
+                <p:cNvPr id="24" name="Textfeld 23">
+                  <a:extLst>
+                    <a:ext uri="{FF2B5EF4-FFF2-40B4-BE49-F238E27FC236}">
+                      <a16:creationId xmlns:a16="http://schemas.microsoft.com/office/drawing/2014/main" id="{B0953C6D-1B61-4364-93CB-ACDEE50C1FA8}"/>
+                    </a:ext>
+                  </a:extLst>
+                </p:cNvPr>
+                <p:cNvSpPr txBox="1">
+                  <a:spLocks noRot="1" noChangeAspect="1" noMove="1" noResize="1" noEditPoints="1" noAdjustHandles="1" noChangeArrowheads="1" noChangeShapeType="1" noTextEdit="1"/>
+                </p:cNvSpPr>
+                <p:nvPr/>
+              </p:nvSpPr>
+              <p:spPr>
+                <a:xfrm>
+                  <a:off x="1608327" y="2698109"/>
+                  <a:ext cx="333369" cy="153888"/>
+                </a:xfrm>
+                <a:prstGeom prst="rect">
+                  <a:avLst/>
+                </a:prstGeom>
+                <a:blipFill>
+                  <a:blip r:embed="rId19"/>
+                  <a:stretch>
+                    <a:fillRect/>
+                  </a:stretch>
+                </a:blipFill>
+              </p:spPr>
+              <p:txBody>
+                <a:bodyPr/>
+                <a:lstStyle/>
+                <a:p>
+                  <a:r>
+                    <a:rPr lang="de-DE">
+                      <a:noFill/>
+                    </a:rPr>
+                    <a:t> </a:t>
+                  </a:r>
+                </a:p>
+              </p:txBody>
+            </p:sp>
+          </mc:Fallback>
+        </mc:AlternateContent>
+      </p:grpSp>
+      <mc:AlternateContent xmlns:mc="http://schemas.openxmlformats.org/markup-compatibility/2006">
+        <mc:Choice xmlns:a14="http://schemas.microsoft.com/office/drawing/2010/main" Requires="a14">
+          <p:sp>
+            <p:nvSpPr>
+              <p:cNvPr id="116" name="Textfeld 115">
+                <a:extLst>
+                  <a:ext uri="{FF2B5EF4-FFF2-40B4-BE49-F238E27FC236}">
+                    <a16:creationId xmlns:a16="http://schemas.microsoft.com/office/drawing/2014/main" id="{2EB64939-86DC-40E4-8327-BB34009EF89B}"/>
+                  </a:ext>
+                </a:extLst>
+              </p:cNvPr>
+              <p:cNvSpPr txBox="1"/>
+              <p:nvPr/>
+            </p:nvSpPr>
+            <p:spPr>
+              <a:xfrm rot="21023404">
+                <a:off x="1196384" y="3438321"/>
+                <a:ext cx="668404" cy="215444"/>
+              </a:xfrm>
+              <a:prstGeom prst="rect">
+                <a:avLst/>
+              </a:prstGeom>
+              <a:noFill/>
+            </p:spPr>
+            <p:txBody>
+              <a:bodyPr wrap="square" rtlCol="0">
+                <a:spAutoFit/>
+              </a:bodyPr>
+              <a:lstStyle/>
+              <a:p>
+                <a14:m>
+                  <m:oMath xmlns:m="http://schemas.openxmlformats.org/officeDocument/2006/math">
+                    <m:r>
+                      <a:rPr lang="de-DE" sz="800" b="0" i="1" smtClean="0">
+                        <a:latin typeface="Cambria Math" panose="02040503050406030204" pitchFamily="18" charset="0"/>
+                      </a:rPr>
+                      <m:t>0.5</m:t>
+                    </m:r>
+                    <m:r>
+                      <a:rPr lang="de-DE" sz="800" b="0" i="1" smtClean="0">
+                        <a:latin typeface="Cambria Math" panose="02040503050406030204" pitchFamily="18" charset="0"/>
+                      </a:rPr>
+                      <m:t>𝑙</m:t>
+                    </m:r>
+                  </m:oMath>
+                </a14:m>
+                <a:r>
+                  <a:rPr lang="de-DE" sz="800" dirty="0"/>
+                  <a:t>  </a:t>
+                </a:r>
+              </a:p>
+            </p:txBody>
+          </p:sp>
+        </mc:Choice>
+        <mc:Fallback>
+          <p:sp>
+            <p:nvSpPr>
+              <p:cNvPr id="116" name="Textfeld 115">
+                <a:extLst>
+                  <a:ext uri="{FF2B5EF4-FFF2-40B4-BE49-F238E27FC236}">
+                    <a16:creationId xmlns:a16="http://schemas.microsoft.com/office/drawing/2014/main" id="{2EB64939-86DC-40E4-8327-BB34009EF89B}"/>
+                  </a:ext>
+                </a:extLst>
+              </p:cNvPr>
+              <p:cNvSpPr txBox="1">
+                <a:spLocks noRot="1" noChangeAspect="1" noMove="1" noResize="1" noEditPoints="1" noAdjustHandles="1" noChangeArrowheads="1" noChangeShapeType="1" noTextEdit="1"/>
+              </p:cNvSpPr>
+              <p:nvPr/>
+            </p:nvSpPr>
+            <p:spPr>
+              <a:xfrm rot="21023404">
+                <a:off x="1196384" y="3438321"/>
+                <a:ext cx="668404" cy="215444"/>
+              </a:xfrm>
+              <a:prstGeom prst="rect">
+                <a:avLst/>
+              </a:prstGeom>
+              <a:blipFill>
+                <a:blip r:embed="rId20"/>
+                <a:stretch>
+                  <a:fillRect/>
+                </a:stretch>
+              </a:blipFill>
+            </p:spPr>
+            <p:txBody>
+              <a:bodyPr/>
+              <a:lstStyle/>
+              <a:p>
+                <a:r>
+                  <a:rPr lang="de-DE">
+                    <a:noFill/>
+                  </a:rPr>
+                  <a:t> </a:t>
+                </a:r>
+              </a:p>
+            </p:txBody>
+          </p:sp>
+        </mc:Fallback>
+      </mc:AlternateContent>
+      <mc:AlternateContent xmlns:mc="http://schemas.openxmlformats.org/markup-compatibility/2006">
+        <mc:Choice xmlns:a14="http://schemas.microsoft.com/office/drawing/2010/main" Requires="a14">
+          <p:sp>
+            <p:nvSpPr>
+              <p:cNvPr id="117" name="Textfeld 116">
+                <a:extLst>
+                  <a:ext uri="{FF2B5EF4-FFF2-40B4-BE49-F238E27FC236}">
+                    <a16:creationId xmlns:a16="http://schemas.microsoft.com/office/drawing/2014/main" id="{FCCCDA2D-0BC1-48C4-9BBE-865CBB702DAF}"/>
+                  </a:ext>
+                </a:extLst>
+              </p:cNvPr>
+              <p:cNvSpPr txBox="1"/>
+              <p:nvPr/>
+            </p:nvSpPr>
+            <p:spPr>
+              <a:xfrm rot="1732454">
+                <a:off x="1607832" y="3550953"/>
+                <a:ext cx="668404" cy="215444"/>
+              </a:xfrm>
+              <a:prstGeom prst="rect">
+                <a:avLst/>
+              </a:prstGeom>
+              <a:noFill/>
+            </p:spPr>
+            <p:txBody>
+              <a:bodyPr wrap="square" rtlCol="0">
+                <a:spAutoFit/>
+              </a:bodyPr>
+              <a:lstStyle/>
+              <a:p>
+                <a14:m>
+                  <m:oMath xmlns:m="http://schemas.openxmlformats.org/officeDocument/2006/math">
+                    <m:r>
+                      <a:rPr lang="de-DE" sz="800" b="0" i="1" smtClean="0">
+                        <a:latin typeface="Cambria Math" panose="02040503050406030204" pitchFamily="18" charset="0"/>
+                      </a:rPr>
+                      <m:t>0.5</m:t>
+                    </m:r>
+                    <m:r>
+                      <a:rPr lang="de-DE" sz="800" b="0" i="1" smtClean="0">
+                        <a:latin typeface="Cambria Math" panose="02040503050406030204" pitchFamily="18" charset="0"/>
+                      </a:rPr>
+                      <m:t>𝑤</m:t>
+                    </m:r>
+                  </m:oMath>
+                </a14:m>
+                <a:r>
+                  <a:rPr lang="de-DE" sz="800" dirty="0"/>
+                  <a:t>  </a:t>
+                </a:r>
+              </a:p>
+            </p:txBody>
+          </p:sp>
+        </mc:Choice>
+        <mc:Fallback>
+          <p:sp>
+            <p:nvSpPr>
+              <p:cNvPr id="117" name="Textfeld 116">
+                <a:extLst>
+                  <a:ext uri="{FF2B5EF4-FFF2-40B4-BE49-F238E27FC236}">
+                    <a16:creationId xmlns:a16="http://schemas.microsoft.com/office/drawing/2014/main" id="{FCCCDA2D-0BC1-48C4-9BBE-865CBB702DAF}"/>
+                  </a:ext>
+                </a:extLst>
+              </p:cNvPr>
+              <p:cNvSpPr txBox="1">
+                <a:spLocks noRot="1" noChangeAspect="1" noMove="1" noResize="1" noEditPoints="1" noAdjustHandles="1" noChangeArrowheads="1" noChangeShapeType="1" noTextEdit="1"/>
+              </p:cNvSpPr>
+              <p:nvPr/>
+            </p:nvSpPr>
+            <p:spPr>
+              <a:xfrm rot="1732454">
+                <a:off x="1607832" y="3550953"/>
+                <a:ext cx="668404" cy="215444"/>
+              </a:xfrm>
+              <a:prstGeom prst="rect">
+                <a:avLst/>
+              </a:prstGeom>
+              <a:blipFill>
+                <a:blip r:embed="rId21"/>
+                <a:stretch>
+                  <a:fillRect/>
+                </a:stretch>
+              </a:blipFill>
+            </p:spPr>
+            <p:txBody>
+              <a:bodyPr/>
+              <a:lstStyle/>
+              <a:p>
+                <a:r>
+                  <a:rPr lang="de-DE">
+                    <a:noFill/>
+                  </a:rPr>
+                  <a:t> </a:t>
+                </a:r>
+              </a:p>
+            </p:txBody>
+          </p:sp>
+        </mc:Fallback>
+      </mc:AlternateContent>
+      <mc:AlternateContent xmlns:mc="http://schemas.openxmlformats.org/markup-compatibility/2006">
+        <mc:Choice xmlns:a14="http://schemas.microsoft.com/office/drawing/2010/main" Requires="a14">
+          <p:sp>
+            <p:nvSpPr>
+              <p:cNvPr id="119" name="Textfeld 118">
+                <a:extLst>
+                  <a:ext uri="{FF2B5EF4-FFF2-40B4-BE49-F238E27FC236}">
+                    <a16:creationId xmlns:a16="http://schemas.microsoft.com/office/drawing/2014/main" id="{3A125EDA-5441-4BF0-8BE1-F58E6E0A022A}"/>
+                  </a:ext>
+                </a:extLst>
+              </p:cNvPr>
+              <p:cNvSpPr txBox="1"/>
+              <p:nvPr/>
+            </p:nvSpPr>
+            <p:spPr>
+              <a:xfrm>
+                <a:off x="1372158" y="3337344"/>
+                <a:ext cx="372899" cy="215444"/>
+              </a:xfrm>
+              <a:prstGeom prst="rect">
+                <a:avLst/>
+              </a:prstGeom>
+              <a:noFill/>
+            </p:spPr>
+            <p:txBody>
+              <a:bodyPr wrap="square" rtlCol="0">
+                <a:spAutoFit/>
+              </a:bodyPr>
+              <a:lstStyle/>
+              <a:p>
+                <a14:m>
+                  <m:oMath xmlns:m="http://schemas.openxmlformats.org/officeDocument/2006/math">
+                    <m:r>
+                      <a:rPr lang="de-DE" sz="800" b="0" i="1" smtClean="0">
+                        <a:latin typeface="Cambria Math" panose="02040503050406030204" pitchFamily="18" charset="0"/>
+                      </a:rPr>
+                      <m:t>0.5</m:t>
+                    </m:r>
+                    <m:r>
+                      <a:rPr lang="de-DE" sz="800" b="0" i="1" smtClean="0">
+                        <a:latin typeface="Cambria Math" panose="02040503050406030204" pitchFamily="18" charset="0"/>
+                      </a:rPr>
+                      <m:t>h</m:t>
+                    </m:r>
+                  </m:oMath>
+                </a14:m>
+                <a:r>
+                  <a:rPr lang="de-DE" sz="800" dirty="0"/>
+                  <a:t>  </a:t>
+                </a:r>
+              </a:p>
+            </p:txBody>
+          </p:sp>
+        </mc:Choice>
+        <mc:Fallback>
+          <p:sp>
+            <p:nvSpPr>
+              <p:cNvPr id="119" name="Textfeld 118">
+                <a:extLst>
+                  <a:ext uri="{FF2B5EF4-FFF2-40B4-BE49-F238E27FC236}">
+                    <a16:creationId xmlns:a16="http://schemas.microsoft.com/office/drawing/2014/main" id="{3A125EDA-5441-4BF0-8BE1-F58E6E0A022A}"/>
+                  </a:ext>
+                </a:extLst>
+              </p:cNvPr>
+              <p:cNvSpPr txBox="1">
+                <a:spLocks noRot="1" noChangeAspect="1" noMove="1" noResize="1" noEditPoints="1" noAdjustHandles="1" noChangeArrowheads="1" noChangeShapeType="1" noTextEdit="1"/>
+              </p:cNvSpPr>
+              <p:nvPr/>
+            </p:nvSpPr>
+            <p:spPr>
+              <a:xfrm>
+                <a:off x="1372158" y="3337344"/>
+                <a:ext cx="372899" cy="215444"/>
+              </a:xfrm>
+              <a:prstGeom prst="rect">
+                <a:avLst/>
+              </a:prstGeom>
+              <a:blipFill>
+                <a:blip r:embed="rId22"/>
+                <a:stretch>
+                  <a:fillRect/>
+                </a:stretch>
+              </a:blipFill>
+            </p:spPr>
+            <p:txBody>
+              <a:bodyPr/>
+              <a:lstStyle/>
+              <a:p>
+                <a:r>
+                  <a:rPr lang="de-DE">
+                    <a:noFill/>
+                  </a:rPr>
+                  <a:t> </a:t>
+                </a:r>
+              </a:p>
+            </p:txBody>
+          </p:sp>
+        </mc:Fallback>
+      </mc:AlternateContent>
+      <p:cxnSp>
+        <p:nvCxnSpPr>
+          <p:cNvPr id="125" name="Gerade Verbindung mit Pfeil 124">
+            <a:extLst>
+              <a:ext uri="{FF2B5EF4-FFF2-40B4-BE49-F238E27FC236}">
+                <a16:creationId xmlns:a16="http://schemas.microsoft.com/office/drawing/2014/main" id="{B59F86DB-9BAA-4CF2-ACAD-B191F6335335}"/>
+              </a:ext>
+            </a:extLst>
+          </p:cNvPr>
+          <p:cNvCxnSpPr>
+            <a:cxnSpLocks/>
+          </p:cNvCxnSpPr>
+          <p:nvPr/>
+        </p:nvCxnSpPr>
+        <p:spPr>
+          <a:xfrm flipV="1">
+            <a:off x="3795841" y="3291736"/>
+            <a:ext cx="0" cy="286086"/>
+          </a:xfrm>
+          <a:prstGeom prst="straightConnector1">
+            <a:avLst/>
+          </a:prstGeom>
+          <a:ln w="9525">
+            <a:solidFill>
+              <a:schemeClr val="tx1">
+                <a:lumMod val="85000"/>
+                <a:lumOff val="15000"/>
+              </a:schemeClr>
+            </a:solidFill>
+            <a:prstDash val="sysDash"/>
+            <a:headEnd type="triangle" w="sm" len="sm"/>
+            <a:tailEnd type="triangle" w="sm" len="sm"/>
+          </a:ln>
+        </p:spPr>
+        <p:style>
+          <a:lnRef idx="1">
+            <a:schemeClr val="accent1"/>
+          </a:lnRef>
+          <a:fillRef idx="0">
+            <a:schemeClr val="accent1"/>
+          </a:fillRef>
+          <a:effectRef idx="0">
+            <a:schemeClr val="accent1"/>
+          </a:effectRef>
+          <a:fontRef idx="minor">
+            <a:schemeClr val="tx1"/>
+          </a:fontRef>
+        </p:style>
+      </p:cxnSp>
+      <p:cxnSp>
+        <p:nvCxnSpPr>
+          <p:cNvPr id="127" name="Gerader Verbinder 126">
+            <a:extLst>
+              <a:ext uri="{FF2B5EF4-FFF2-40B4-BE49-F238E27FC236}">
+                <a16:creationId xmlns:a16="http://schemas.microsoft.com/office/drawing/2014/main" id="{49AE981E-6CCA-45F0-A7E1-B73675E204D0}"/>
+              </a:ext>
+            </a:extLst>
+          </p:cNvPr>
+          <p:cNvCxnSpPr>
+            <a:cxnSpLocks/>
+          </p:cNvCxnSpPr>
+          <p:nvPr/>
+        </p:nvCxnSpPr>
+        <p:spPr>
+          <a:xfrm>
+            <a:off x="3706499" y="3291151"/>
+            <a:ext cx="111997" cy="0"/>
+          </a:xfrm>
+          <a:prstGeom prst="line">
+            <a:avLst/>
+          </a:prstGeom>
+          <a:ln>
+            <a:solidFill>
+              <a:schemeClr val="tx1">
+                <a:lumMod val="85000"/>
+                <a:lumOff val="15000"/>
+              </a:schemeClr>
+            </a:solidFill>
+          </a:ln>
+        </p:spPr>
+        <p:style>
+          <a:lnRef idx="1">
+            <a:schemeClr val="accent1"/>
+          </a:lnRef>
+          <a:fillRef idx="0">
+            <a:schemeClr val="accent1"/>
+          </a:fillRef>
+          <a:effectRef idx="0">
+            <a:schemeClr val="accent1"/>
+          </a:effectRef>
+          <a:fontRef idx="minor">
+            <a:schemeClr val="tx1"/>
+          </a:fontRef>
+        </p:style>
+      </p:cxnSp>
+      <p:sp>
+        <p:nvSpPr>
+          <p:cNvPr id="37" name="Ellipse 36">
+            <a:extLst>
+              <a:ext uri="{FF2B5EF4-FFF2-40B4-BE49-F238E27FC236}">
+                <a16:creationId xmlns:a16="http://schemas.microsoft.com/office/drawing/2014/main" id="{5FE1D8E3-61D4-4FFE-AF53-C92B92D88599}"/>
+              </a:ext>
+            </a:extLst>
+          </p:cNvPr>
+          <p:cNvSpPr/>
+          <p:nvPr/>
+        </p:nvSpPr>
+        <p:spPr>
+          <a:xfrm>
+            <a:off x="3674295" y="3231411"/>
+            <a:ext cx="60736" cy="60736"/>
+          </a:xfrm>
+          <a:prstGeom prst="ellipse">
+            <a:avLst/>
+          </a:prstGeom>
+          <a:solidFill>
+            <a:schemeClr val="tx1">
+              <a:lumMod val="85000"/>
+              <a:lumOff val="15000"/>
+            </a:schemeClr>
+          </a:solidFill>
+          <a:ln>
+            <a:noFill/>
+          </a:ln>
+          <a:effectLst/>
+          <a:scene3d>
+            <a:camera prst="isometricOffAxis1Top"/>
+            <a:lightRig rig="threePt" dir="t"/>
+          </a:scene3d>
+          <a:sp3d>
+            <a:bevelT w="30480" h="30480"/>
+            <a:bevelB w="30480" h="30480"/>
+          </a:sp3d>
+        </p:spPr>
+        <p:style>
+          <a:lnRef idx="2">
+            <a:schemeClr val="accent1">
+              <a:shade val="50000"/>
+            </a:schemeClr>
+          </a:lnRef>
+          <a:fillRef idx="1">
+            <a:schemeClr val="accent1"/>
+          </a:fillRef>
+          <a:effectRef idx="0">
+            <a:schemeClr val="accent1"/>
+          </a:effectRef>
+          <a:fontRef idx="minor">
+            <a:schemeClr val="lt1"/>
+          </a:fontRef>
+        </p:style>
+        <p:txBody>
+          <a:bodyPr rot="0" spcFirstLastPara="0" vertOverflow="overflow" horzOverflow="overflow" vert="horz" wrap="square" lIns="91440" tIns="45720" rIns="91440" bIns="45720" numCol="1" spcCol="0" rtlCol="0" fromWordArt="0" anchor="ctr" anchorCtr="0" forceAA="0" compatLnSpc="1">
+            <a:prstTxWarp prst="textNoShape">
+              <a:avLst/>
+            </a:prstTxWarp>
+            <a:noAutofit/>
+          </a:bodyPr>
+          <a:lstStyle/>
+          <a:p>
+            <a:pPr algn="ctr"/>
+            <a:endParaRPr lang="de-DE"/>
+          </a:p>
+        </p:txBody>
+      </p:sp>
+      <p:cxnSp>
+        <p:nvCxnSpPr>
+          <p:cNvPr id="128" name="Gerader Verbinder 127">
+            <a:extLst>
+              <a:ext uri="{FF2B5EF4-FFF2-40B4-BE49-F238E27FC236}">
+                <a16:creationId xmlns:a16="http://schemas.microsoft.com/office/drawing/2014/main" id="{6A7D5E3E-2105-40B5-980A-4B1DE91849DD}"/>
+              </a:ext>
+            </a:extLst>
+          </p:cNvPr>
+          <p:cNvCxnSpPr>
+            <a:cxnSpLocks/>
+          </p:cNvCxnSpPr>
+          <p:nvPr/>
+        </p:nvCxnSpPr>
+        <p:spPr>
+          <a:xfrm>
+            <a:off x="3735031" y="3572671"/>
+            <a:ext cx="111997" cy="0"/>
+          </a:xfrm>
+          <a:prstGeom prst="line">
+            <a:avLst/>
+          </a:prstGeom>
+          <a:ln>
+            <a:solidFill>
+              <a:schemeClr val="tx1">
+                <a:lumMod val="85000"/>
+                <a:lumOff val="15000"/>
+              </a:schemeClr>
+            </a:solidFill>
+          </a:ln>
+        </p:spPr>
+        <p:style>
+          <a:lnRef idx="1">
+            <a:schemeClr val="accent1"/>
+          </a:lnRef>
+          <a:fillRef idx="0">
+            <a:schemeClr val="accent1"/>
+          </a:fillRef>
+          <a:effectRef idx="0">
+            <a:schemeClr val="accent1"/>
+          </a:effectRef>
+          <a:fontRef idx="minor">
+            <a:schemeClr val="tx1"/>
+          </a:fontRef>
+        </p:style>
+      </p:cxnSp>
+      <mc:AlternateContent xmlns:mc="http://schemas.openxmlformats.org/markup-compatibility/2006">
+        <mc:Choice xmlns:a14="http://schemas.microsoft.com/office/drawing/2010/main" Requires="a14">
+          <p:sp>
+            <p:nvSpPr>
+              <p:cNvPr id="129" name="Textfeld 128">
+                <a:extLst>
+                  <a:ext uri="{FF2B5EF4-FFF2-40B4-BE49-F238E27FC236}">
+                    <a16:creationId xmlns:a16="http://schemas.microsoft.com/office/drawing/2014/main" id="{1EE502A7-A8DD-4C80-856E-888992E2FFEF}"/>
+                  </a:ext>
+                </a:extLst>
+              </p:cNvPr>
+              <p:cNvSpPr txBox="1"/>
+              <p:nvPr/>
+            </p:nvSpPr>
+            <p:spPr>
+              <a:xfrm>
+                <a:off x="3736037" y="3324925"/>
+                <a:ext cx="372899" cy="215444"/>
+              </a:xfrm>
+              <a:prstGeom prst="rect">
+                <a:avLst/>
+              </a:prstGeom>
+              <a:noFill/>
+            </p:spPr>
+            <p:txBody>
+              <a:bodyPr wrap="square" rtlCol="0">
+                <a:spAutoFit/>
+              </a:bodyPr>
+              <a:lstStyle/>
+              <a:p>
+                <a14:m>
+                  <m:oMath xmlns:m="http://schemas.openxmlformats.org/officeDocument/2006/math">
+                    <m:r>
+                      <a:rPr lang="de-DE" sz="800" b="0" i="1" smtClean="0">
+                        <a:latin typeface="Cambria Math" panose="02040503050406030204" pitchFamily="18" charset="0"/>
+                      </a:rPr>
+                      <m:t>0.5</m:t>
+                    </m:r>
+                    <m:r>
+                      <a:rPr lang="de-DE" sz="800" b="0" i="1" smtClean="0">
+                        <a:latin typeface="Cambria Math" panose="02040503050406030204" pitchFamily="18" charset="0"/>
+                      </a:rPr>
+                      <m:t>h</m:t>
+                    </m:r>
+                  </m:oMath>
+                </a14:m>
+                <a:r>
+                  <a:rPr lang="de-DE" sz="800" dirty="0"/>
+                  <a:t>  </a:t>
+                </a:r>
+              </a:p>
+            </p:txBody>
+          </p:sp>
+        </mc:Choice>
+        <mc:Fallback>
+          <p:sp>
+            <p:nvSpPr>
+              <p:cNvPr id="129" name="Textfeld 128">
+                <a:extLst>
+                  <a:ext uri="{FF2B5EF4-FFF2-40B4-BE49-F238E27FC236}">
+                    <a16:creationId xmlns:a16="http://schemas.microsoft.com/office/drawing/2014/main" id="{1EE502A7-A8DD-4C80-856E-888992E2FFEF}"/>
+                  </a:ext>
+                </a:extLst>
+              </p:cNvPr>
+              <p:cNvSpPr txBox="1">
+                <a:spLocks noRot="1" noChangeAspect="1" noMove="1" noResize="1" noEditPoints="1" noAdjustHandles="1" noChangeArrowheads="1" noChangeShapeType="1" noTextEdit="1"/>
+              </p:cNvSpPr>
+              <p:nvPr/>
+            </p:nvSpPr>
+            <p:spPr>
+              <a:xfrm>
+                <a:off x="3736037" y="3324925"/>
+                <a:ext cx="372899" cy="215444"/>
+              </a:xfrm>
+              <a:prstGeom prst="rect">
+                <a:avLst/>
+              </a:prstGeom>
+              <a:blipFill>
+                <a:blip r:embed="rId22"/>
+                <a:stretch>
+                  <a:fillRect/>
+                </a:stretch>
+              </a:blipFill>
+            </p:spPr>
+            <p:txBody>
+              <a:bodyPr/>
+              <a:lstStyle/>
+              <a:p>
+                <a:r>
+                  <a:rPr lang="de-DE">
+                    <a:noFill/>
+                  </a:rPr>
+                  <a:t> </a:t>
+                </a:r>
+              </a:p>
+            </p:txBody>
+          </p:sp>
+        </mc:Fallback>
+      </mc:AlternateContent>
     </p:spTree>
     <p:extLst>
       <p:ext uri="{BB962C8B-B14F-4D97-AF65-F5344CB8AC3E}">

</xml_diff>

<commit_message>
change cuboid to parallelepiped
</commit_message>
<xml_diff>
--- a/documentation/geometryBaseTypes.pptx
+++ b/documentation/geometryBaseTypes.pptx
@@ -259,7 +259,7 @@
           <a:p>
             <a:fld id="{715DB31A-0B2B-4E58-B8E4-5EFF1931F507}" type="datetimeFigureOut">
               <a:rPr lang="de-DE" smtClean="0"/>
-              <a:t>16.11.2023</a:t>
+              <a:t>17.11.2023</a:t>
             </a:fld>
             <a:endParaRPr lang="de-DE"/>
           </a:p>
@@ -457,7 +457,7 @@
           <a:p>
             <a:fld id="{715DB31A-0B2B-4E58-B8E4-5EFF1931F507}" type="datetimeFigureOut">
               <a:rPr lang="de-DE" smtClean="0"/>
-              <a:t>16.11.2023</a:t>
+              <a:t>17.11.2023</a:t>
             </a:fld>
             <a:endParaRPr lang="de-DE"/>
           </a:p>
@@ -665,7 +665,7 @@
           <a:p>
             <a:fld id="{715DB31A-0B2B-4E58-B8E4-5EFF1931F507}" type="datetimeFigureOut">
               <a:rPr lang="de-DE" smtClean="0"/>
-              <a:t>16.11.2023</a:t>
+              <a:t>17.11.2023</a:t>
             </a:fld>
             <a:endParaRPr lang="de-DE"/>
           </a:p>
@@ -863,7 +863,7 @@
           <a:p>
             <a:fld id="{715DB31A-0B2B-4E58-B8E4-5EFF1931F507}" type="datetimeFigureOut">
               <a:rPr lang="de-DE" smtClean="0"/>
-              <a:t>16.11.2023</a:t>
+              <a:t>17.11.2023</a:t>
             </a:fld>
             <a:endParaRPr lang="de-DE"/>
           </a:p>
@@ -1138,7 +1138,7 @@
           <a:p>
             <a:fld id="{715DB31A-0B2B-4E58-B8E4-5EFF1931F507}" type="datetimeFigureOut">
               <a:rPr lang="de-DE" smtClean="0"/>
-              <a:t>16.11.2023</a:t>
+              <a:t>17.11.2023</a:t>
             </a:fld>
             <a:endParaRPr lang="de-DE"/>
           </a:p>
@@ -1403,7 +1403,7 @@
           <a:p>
             <a:fld id="{715DB31A-0B2B-4E58-B8E4-5EFF1931F507}" type="datetimeFigureOut">
               <a:rPr lang="de-DE" smtClean="0"/>
-              <a:t>16.11.2023</a:t>
+              <a:t>17.11.2023</a:t>
             </a:fld>
             <a:endParaRPr lang="de-DE"/>
           </a:p>
@@ -1815,7 +1815,7 @@
           <a:p>
             <a:fld id="{715DB31A-0B2B-4E58-B8E4-5EFF1931F507}" type="datetimeFigureOut">
               <a:rPr lang="de-DE" smtClean="0"/>
-              <a:t>16.11.2023</a:t>
+              <a:t>17.11.2023</a:t>
             </a:fld>
             <a:endParaRPr lang="de-DE"/>
           </a:p>
@@ -1956,7 +1956,7 @@
           <a:p>
             <a:fld id="{715DB31A-0B2B-4E58-B8E4-5EFF1931F507}" type="datetimeFigureOut">
               <a:rPr lang="de-DE" smtClean="0"/>
-              <a:t>16.11.2023</a:t>
+              <a:t>17.11.2023</a:t>
             </a:fld>
             <a:endParaRPr lang="de-DE"/>
           </a:p>
@@ -2069,7 +2069,7 @@
           <a:p>
             <a:fld id="{715DB31A-0B2B-4E58-B8E4-5EFF1931F507}" type="datetimeFigureOut">
               <a:rPr lang="de-DE" smtClean="0"/>
-              <a:t>16.11.2023</a:t>
+              <a:t>17.11.2023</a:t>
             </a:fld>
             <a:endParaRPr lang="de-DE"/>
           </a:p>
@@ -2380,7 +2380,7 @@
           <a:p>
             <a:fld id="{715DB31A-0B2B-4E58-B8E4-5EFF1931F507}" type="datetimeFigureOut">
               <a:rPr lang="de-DE" smtClean="0"/>
-              <a:t>16.11.2023</a:t>
+              <a:t>17.11.2023</a:t>
             </a:fld>
             <a:endParaRPr lang="de-DE"/>
           </a:p>
@@ -2668,7 +2668,7 @@
           <a:p>
             <a:fld id="{715DB31A-0B2B-4E58-B8E4-5EFF1931F507}" type="datetimeFigureOut">
               <a:rPr lang="de-DE" smtClean="0"/>
-              <a:t>16.11.2023</a:t>
+              <a:t>17.11.2023</a:t>
             </a:fld>
             <a:endParaRPr lang="de-DE"/>
           </a:p>
@@ -2909,7 +2909,7 @@
           <a:p>
             <a:fld id="{715DB31A-0B2B-4E58-B8E4-5EFF1931F507}" type="datetimeFigureOut">
               <a:rPr lang="de-DE" smtClean="0"/>
-              <a:t>16.11.2023</a:t>
+              <a:t>17.11.2023</a:t>
             </a:fld>
             <a:endParaRPr lang="de-DE"/>
           </a:p>
@@ -3682,8 +3682,8 @@
           </a:fontRef>
         </p:style>
       </p:cxnSp>
-      <mc:AlternateContent xmlns:mc="http://schemas.openxmlformats.org/markup-compatibility/2006">
-        <mc:Choice xmlns:a14="http://schemas.microsoft.com/office/drawing/2010/main" Requires="a14">
+      <mc:AlternateContent xmlns:mc="http://schemas.openxmlformats.org/markup-compatibility/2006" xmlns:a14="http://schemas.microsoft.com/office/drawing/2010/main">
+        <mc:Choice Requires="a14">
           <p:sp>
             <p:nvSpPr>
               <p:cNvPr id="36" name="Textfeld 35">
@@ -3733,7 +3733,7 @@
             </p:txBody>
           </p:sp>
         </mc:Choice>
-        <mc:Fallback>
+        <mc:Fallback xmlns="">
           <p:sp>
             <p:nvSpPr>
               <p:cNvPr id="36" name="Textfeld 35">
@@ -3778,8 +3778,8 @@
           </p:sp>
         </mc:Fallback>
       </mc:AlternateContent>
-      <mc:AlternateContent xmlns:mc="http://schemas.openxmlformats.org/markup-compatibility/2006">
-        <mc:Choice xmlns:a14="http://schemas.microsoft.com/office/drawing/2010/main" Requires="a14">
+      <mc:AlternateContent xmlns:mc="http://schemas.openxmlformats.org/markup-compatibility/2006" xmlns:a14="http://schemas.microsoft.com/office/drawing/2010/main">
+        <mc:Choice Requires="a14">
           <p:sp>
             <p:nvSpPr>
               <p:cNvPr id="38" name="Textfeld 37">
@@ -3829,7 +3829,7 @@
             </p:txBody>
           </p:sp>
         </mc:Choice>
-        <mc:Fallback>
+        <mc:Fallback xmlns="">
           <p:sp>
             <p:nvSpPr>
               <p:cNvPr id="38" name="Textfeld 37">
@@ -3874,8 +3874,8 @@
           </p:sp>
         </mc:Fallback>
       </mc:AlternateContent>
-      <mc:AlternateContent xmlns:mc="http://schemas.openxmlformats.org/markup-compatibility/2006">
-        <mc:Choice xmlns:a14="http://schemas.microsoft.com/office/drawing/2010/main" Requires="a14">
+      <mc:AlternateContent xmlns:mc="http://schemas.openxmlformats.org/markup-compatibility/2006" xmlns:a14="http://schemas.microsoft.com/office/drawing/2010/main">
+        <mc:Choice Requires="a14">
           <p:sp>
             <p:nvSpPr>
               <p:cNvPr id="39" name="Textfeld 38">
@@ -3925,7 +3925,7 @@
             </p:txBody>
           </p:sp>
         </mc:Choice>
-        <mc:Fallback>
+        <mc:Fallback xmlns="">
           <p:sp>
             <p:nvSpPr>
               <p:cNvPr id="39" name="Textfeld 38">
@@ -4372,8 +4372,8 @@
           </p:sp>
         </mc:Fallback>
       </mc:AlternateContent>
-      <mc:AlternateContent xmlns:mc="http://schemas.openxmlformats.org/markup-compatibility/2006">
-        <mc:Choice xmlns:a14="http://schemas.microsoft.com/office/drawing/2010/main" Requires="a14">
+      <mc:AlternateContent xmlns:mc="http://schemas.openxmlformats.org/markup-compatibility/2006" xmlns:a14="http://schemas.microsoft.com/office/drawing/2010/main">
+        <mc:Choice Requires="a14">
           <p:sp>
             <p:nvSpPr>
               <p:cNvPr id="52" name="Textfeld 51">
@@ -4423,7 +4423,7 @@
             </p:txBody>
           </p:sp>
         </mc:Choice>
-        <mc:Fallback>
+        <mc:Fallback xmlns="">
           <p:sp>
             <p:nvSpPr>
               <p:cNvPr id="52" name="Textfeld 51">
@@ -4614,8 +4614,8 @@
           </a:fontRef>
         </p:style>
       </p:cxnSp>
-      <mc:AlternateContent xmlns:mc="http://schemas.openxmlformats.org/markup-compatibility/2006">
-        <mc:Choice xmlns:a14="http://schemas.microsoft.com/office/drawing/2010/main" Requires="a14">
+      <mc:AlternateContent xmlns:mc="http://schemas.openxmlformats.org/markup-compatibility/2006" xmlns:a14="http://schemas.microsoft.com/office/drawing/2010/main">
+        <mc:Choice Requires="a14">
           <p:sp>
             <p:nvSpPr>
               <p:cNvPr id="69" name="Textfeld 68">
@@ -4667,7 +4667,7 @@
             </p:txBody>
           </p:sp>
         </mc:Choice>
-        <mc:Fallback>
+        <mc:Fallback xmlns="">
           <p:sp>
             <p:nvSpPr>
               <p:cNvPr id="69" name="Textfeld 68">
@@ -4727,7 +4727,7 @@
         <p:spPr>
           <a:xfrm>
             <a:off x="3958483" y="2726702"/>
-            <a:ext cx="838691" cy="246221"/>
+            <a:ext cx="902811" cy="246221"/>
           </a:xfrm>
           <a:prstGeom prst="rect">
             <a:avLst/>
@@ -4744,7 +4744,10 @@
               <a:rPr lang="de-DE" sz="1000" dirty="0" err="1"/>
               <a:t>upperRadius</a:t>
             </a:r>
-            <a:endParaRPr lang="de-DE" sz="1000" dirty="0"/>
+            <a:r>
+              <a:rPr lang="de-DE" sz="1000" dirty="0"/>
+              <a:t>*</a:t>
+            </a:r>
           </a:p>
         </p:txBody>
       </p:sp>
@@ -5905,8 +5908,8 @@
         </p:nvSpPr>
         <p:spPr>
           <a:xfrm>
-            <a:off x="1345593" y="1790313"/>
-            <a:ext cx="679994" cy="307777"/>
+            <a:off x="1077747" y="1790313"/>
+            <a:ext cx="1230978" cy="307777"/>
           </a:xfrm>
           <a:prstGeom prst="rect">
             <a:avLst/>
@@ -5921,7 +5924,7 @@
           <a:p>
             <a:r>
               <a:rPr lang="de-DE" sz="1400" dirty="0" err="1"/>
-              <a:t>cuboid</a:t>
+              <a:t>parallelepiped</a:t>
             </a:r>
             <a:endParaRPr lang="de-DE" sz="1400" dirty="0"/>
           </a:p>
@@ -6198,7 +6201,7 @@
             </p:nvSpPr>
             <p:spPr>
               <a:xfrm>
-                <a:off x="1704350" y="3743908"/>
+                <a:off x="1848576" y="3714294"/>
                 <a:ext cx="668404" cy="246221"/>
               </a:xfrm>
               <a:prstGeom prst="rect">
@@ -6212,17 +6215,13 @@
               </a:bodyPr>
               <a:lstStyle/>
               <a:p>
-                <a:r>
-                  <a:rPr lang="de-DE" sz="1000" dirty="0"/>
-                  <a:t>length </a:t>
-                </a:r>
                 <a14:m>
                   <m:oMath xmlns:m="http://schemas.openxmlformats.org/officeDocument/2006/math">
                     <m:r>
                       <a:rPr lang="de-DE" sz="1000" b="0" i="1" smtClean="0">
                         <a:latin typeface="Cambria Math" panose="02040503050406030204" pitchFamily="18" charset="0"/>
                       </a:rPr>
-                      <m:t>𝑙</m:t>
+                      <m:t>𝑎</m:t>
                     </m:r>
                   </m:oMath>
                 </a14:m>
@@ -6251,7 +6250,7 @@
             </p:nvSpPr>
             <p:spPr>
               <a:xfrm>
-                <a:off x="1704350" y="3743908"/>
+                <a:off x="1848576" y="3714294"/>
                 <a:ext cx="668404" cy="246221"/>
               </a:xfrm>
               <a:prstGeom prst="rect">
@@ -6260,7 +6259,7 @@
               <a:blipFill>
                 <a:blip r:embed="rId14"/>
                 <a:stretch>
-                  <a:fillRect b="-14634"/>
+                  <a:fillRect/>
                 </a:stretch>
               </a:blipFill>
             </p:spPr>
@@ -6295,8 +6294,8 @@
             </p:nvSpPr>
             <p:spPr>
               <a:xfrm>
-                <a:off x="252281" y="3244006"/>
-                <a:ext cx="654857" cy="246221"/>
+                <a:off x="580000" y="3180422"/>
+                <a:ext cx="317720" cy="246221"/>
               </a:xfrm>
               <a:prstGeom prst="rect">
                 <a:avLst/>
@@ -6309,19 +6308,20 @@
               </a:bodyPr>
               <a:lstStyle/>
               <a:p>
-                <a:r>
-                  <a:rPr lang="de-DE" sz="1000" dirty="0"/>
-                  <a:t>height </a:t>
-                </a:r>
                 <a14:m>
-                  <m:oMath xmlns:m="http://schemas.openxmlformats.org/officeDocument/2006/math">
-                    <m:r>
-                      <a:rPr lang="de-DE" sz="1000" b="0" i="1" dirty="0" smtClean="0">
-                        <a:latin typeface="Cambria Math" panose="02040503050406030204" pitchFamily="18" charset="0"/>
-                      </a:rPr>
-                      <m:t>h</m:t>
-                    </m:r>
-                  </m:oMath>
+                  <m:oMathPara xmlns:m="http://schemas.openxmlformats.org/officeDocument/2006/math">
+                    <m:oMathParaPr>
+                      <m:jc m:val="centerGroup"/>
+                    </m:oMathParaPr>
+                    <m:oMath xmlns:m="http://schemas.openxmlformats.org/officeDocument/2006/math">
+                      <m:r>
+                        <a:rPr lang="de-DE" sz="1000" b="0" i="1" dirty="0" smtClean="0">
+                          <a:latin typeface="Cambria Math" panose="02040503050406030204" pitchFamily="18" charset="0"/>
+                        </a:rPr>
+                        <m:t>𝑐</m:t>
+                      </m:r>
+                    </m:oMath>
+                  </m:oMathPara>
                 </a14:m>
                 <a:endParaRPr lang="de-DE" sz="1000" dirty="0"/>
               </a:p>
@@ -6345,8 +6345,8 @@
             </p:nvSpPr>
             <p:spPr>
               <a:xfrm>
-                <a:off x="252281" y="3244006"/>
-                <a:ext cx="654857" cy="246221"/>
+                <a:off x="580000" y="3180422"/>
+                <a:ext cx="317720" cy="246221"/>
               </a:xfrm>
               <a:prstGeom prst="rect">
                 <a:avLst/>
@@ -6354,7 +6354,7 @@
               <a:blipFill>
                 <a:blip r:embed="rId15"/>
                 <a:stretch>
-                  <a:fillRect b="-14634"/>
+                  <a:fillRect/>
                 </a:stretch>
               </a:blipFill>
             </p:spPr>
@@ -6389,7 +6389,7 @@
             </p:nvSpPr>
             <p:spPr>
               <a:xfrm>
-                <a:off x="449277" y="3638825"/>
+                <a:off x="597872" y="3658537"/>
                 <a:ext cx="649745" cy="246221"/>
               </a:xfrm>
               <a:prstGeom prst="rect">
@@ -6403,19 +6403,20 @@
               </a:bodyPr>
               <a:lstStyle/>
               <a:p>
-                <a:r>
-                  <a:rPr lang="de-DE" sz="1000" dirty="0"/>
-                  <a:t>width </a:t>
-                </a:r>
                 <a14:m>
-                  <m:oMath xmlns:m="http://schemas.openxmlformats.org/officeDocument/2006/math">
-                    <m:r>
-                      <a:rPr lang="de-DE" sz="1000" b="0" i="1" smtClean="0">
-                        <a:latin typeface="Cambria Math" panose="02040503050406030204" pitchFamily="18" charset="0"/>
-                      </a:rPr>
-                      <m:t>𝑤</m:t>
-                    </m:r>
-                  </m:oMath>
+                  <m:oMathPara xmlns:m="http://schemas.openxmlformats.org/officeDocument/2006/math">
+                    <m:oMathParaPr>
+                      <m:jc m:val="centerGroup"/>
+                    </m:oMathParaPr>
+                    <m:oMath xmlns:m="http://schemas.openxmlformats.org/officeDocument/2006/math">
+                      <m:r>
+                        <a:rPr lang="de-DE" sz="1000" b="0" i="1" smtClean="0">
+                          <a:latin typeface="Cambria Math" panose="02040503050406030204" pitchFamily="18" charset="0"/>
+                        </a:rPr>
+                        <m:t>𝑏</m:t>
+                      </m:r>
+                    </m:oMath>
+                  </m:oMathPara>
                 </a14:m>
                 <a:endParaRPr lang="de-DE" sz="1000" dirty="0"/>
               </a:p>
@@ -6439,7 +6440,7 @@
             </p:nvSpPr>
             <p:spPr>
               <a:xfrm>
-                <a:off x="449277" y="3638825"/>
+                <a:off x="597872" y="3658537"/>
                 <a:ext cx="649745" cy="246221"/>
               </a:xfrm>
               <a:prstGeom prst="rect">
@@ -6448,7 +6449,7 @@
               <a:blipFill>
                 <a:blip r:embed="rId16"/>
                 <a:stretch>
-                  <a:fillRect b="-15000"/>
+                  <a:fillRect/>
                 </a:stretch>
               </a:blipFill>
             </p:spPr>
@@ -6907,8 +6908,8 @@
             </a:fontRef>
           </p:style>
         </p:cxnSp>
-        <mc:AlternateContent xmlns:mc="http://schemas.openxmlformats.org/markup-compatibility/2006">
-          <mc:Choice xmlns:a14="http://schemas.microsoft.com/office/drawing/2010/main" Requires="a14">
+        <mc:AlternateContent xmlns:mc="http://schemas.openxmlformats.org/markup-compatibility/2006" xmlns:a14="http://schemas.microsoft.com/office/drawing/2010/main">
+          <mc:Choice Requires="a14">
             <p:sp>
               <p:nvSpPr>
                 <p:cNvPr id="20" name="Textfeld 19">
@@ -6958,7 +6959,7 @@
               </p:txBody>
             </p:sp>
           </mc:Choice>
-          <mc:Fallback>
+          <mc:Fallback xmlns="">
             <p:sp>
               <p:nvSpPr>
                 <p:cNvPr id="20" name="Textfeld 19">
@@ -7072,8 +7073,8 @@
             </a:p>
           </p:txBody>
         </p:sp>
-        <mc:AlternateContent xmlns:mc="http://schemas.openxmlformats.org/markup-compatibility/2006">
-          <mc:Choice xmlns:a14="http://schemas.microsoft.com/office/drawing/2010/main" Requires="a14">
+        <mc:AlternateContent xmlns:mc="http://schemas.openxmlformats.org/markup-compatibility/2006" xmlns:a14="http://schemas.microsoft.com/office/drawing/2010/main">
+          <mc:Choice Requires="a14">
             <p:sp>
               <p:nvSpPr>
                 <p:cNvPr id="23" name="Textfeld 22">
@@ -7123,7 +7124,7 @@
               </p:txBody>
             </p:sp>
           </mc:Choice>
-          <mc:Fallback>
+          <mc:Fallback xmlns="">
             <p:sp>
               <p:nvSpPr>
                 <p:cNvPr id="23" name="Textfeld 22">
@@ -7168,8 +7169,8 @@
             </p:sp>
           </mc:Fallback>
         </mc:AlternateContent>
-        <mc:AlternateContent xmlns:mc="http://schemas.openxmlformats.org/markup-compatibility/2006">
-          <mc:Choice xmlns:a14="http://schemas.microsoft.com/office/drawing/2010/main" Requires="a14">
+        <mc:AlternateContent xmlns:mc="http://schemas.openxmlformats.org/markup-compatibility/2006" xmlns:a14="http://schemas.microsoft.com/office/drawing/2010/main">
+          <mc:Choice Requires="a14">
             <p:sp>
               <p:nvSpPr>
                 <p:cNvPr id="24" name="Textfeld 23">
@@ -7219,7 +7220,7 @@
               </p:txBody>
             </p:sp>
           </mc:Choice>
-          <mc:Fallback>
+          <mc:Fallback xmlns="">
             <p:sp>
               <p:nvSpPr>
                 <p:cNvPr id="24" name="Textfeld 23">
@@ -7307,7 +7308,7 @@
                       <a:rPr lang="de-DE" sz="800" b="0" i="1" smtClean="0">
                         <a:latin typeface="Cambria Math" panose="02040503050406030204" pitchFamily="18" charset="0"/>
                       </a:rPr>
-                      <m:t>𝑙</m:t>
+                      <m:t>𝑎</m:t>
                     </m:r>
                   </m:oMath>
                 </a14:m>
@@ -7406,7 +7407,7 @@
                       <a:rPr lang="de-DE" sz="800" b="0" i="1" smtClean="0">
                         <a:latin typeface="Cambria Math" panose="02040503050406030204" pitchFamily="18" charset="0"/>
                       </a:rPr>
-                      <m:t>𝑤</m:t>
+                      <m:t>𝑏</m:t>
                     </m:r>
                   </m:oMath>
                 </a14:m>
@@ -7463,8 +7464,8 @@
           </p:sp>
         </mc:Fallback>
       </mc:AlternateContent>
-      <mc:AlternateContent xmlns:mc="http://schemas.openxmlformats.org/markup-compatibility/2006">
-        <mc:Choice xmlns:a14="http://schemas.microsoft.com/office/drawing/2010/main" Requires="a14">
+      <mc:AlternateContent xmlns:mc="http://schemas.openxmlformats.org/markup-compatibility/2006" xmlns:a14="http://schemas.microsoft.com/office/drawing/2010/main">
+        <mc:Choice Requires="a14">
           <p:sp>
             <p:nvSpPr>
               <p:cNvPr id="119" name="Textfeld 118">
@@ -7517,7 +7518,7 @@
             </p:txBody>
           </p:sp>
         </mc:Choice>
-        <mc:Fallback>
+        <mc:Fallback xmlns="">
           <p:sp>
             <p:nvSpPr>
               <p:cNvPr id="119" name="Textfeld 118">
@@ -7772,8 +7773,8 @@
           </a:fontRef>
         </p:style>
       </p:cxnSp>
-      <mc:AlternateContent xmlns:mc="http://schemas.openxmlformats.org/markup-compatibility/2006">
-        <mc:Choice xmlns:a14="http://schemas.microsoft.com/office/drawing/2010/main" Requires="a14">
+      <mc:AlternateContent xmlns:mc="http://schemas.openxmlformats.org/markup-compatibility/2006" xmlns:a14="http://schemas.microsoft.com/office/drawing/2010/main">
+        <mc:Choice Requires="a14">
           <p:sp>
             <p:nvSpPr>
               <p:cNvPr id="129" name="Textfeld 128">
@@ -7826,7 +7827,7 @@
             </p:txBody>
           </p:sp>
         </mc:Choice>
-        <mc:Fallback>
+        <mc:Fallback xmlns="">
           <p:sp>
             <p:nvSpPr>
               <p:cNvPr id="129" name="Textfeld 128">
@@ -7871,6 +7872,54 @@
           </p:sp>
         </mc:Fallback>
       </mc:AlternateContent>
+      <p:sp>
+        <p:nvSpPr>
+          <p:cNvPr id="77" name="Textfeld 76">
+            <a:extLst>
+              <a:ext uri="{FF2B5EF4-FFF2-40B4-BE49-F238E27FC236}">
+                <a16:creationId xmlns:a16="http://schemas.microsoft.com/office/drawing/2014/main" id="{C1354CED-DB87-4C04-805C-D2A5F00E90FB}"/>
+              </a:ext>
+            </a:extLst>
+          </p:cNvPr>
+          <p:cNvSpPr txBox="1"/>
+          <p:nvPr/>
+        </p:nvSpPr>
+        <p:spPr>
+          <a:xfrm>
+            <a:off x="3357679" y="4112751"/>
+            <a:ext cx="1600118" cy="215444"/>
+          </a:xfrm>
+          <a:prstGeom prst="rect">
+            <a:avLst/>
+          </a:prstGeom>
+          <a:noFill/>
+        </p:spPr>
+        <p:txBody>
+          <a:bodyPr wrap="none" rtlCol="0">
+            <a:spAutoFit/>
+          </a:bodyPr>
+          <a:lstStyle/>
+          <a:p>
+            <a:r>
+              <a:rPr lang="de-DE" sz="800" dirty="0"/>
+              <a:t>*) optional, </a:t>
+            </a:r>
+            <a:r>
+              <a:rPr lang="de-DE" sz="800" dirty="0" err="1"/>
+              <a:t>default</a:t>
+            </a:r>
+            <a:r>
+              <a:rPr lang="de-DE" sz="800" dirty="0"/>
+              <a:t> = </a:t>
+            </a:r>
+            <a:r>
+              <a:rPr lang="de-DE" sz="800" dirty="0" err="1"/>
+              <a:t>lowerRadius</a:t>
+            </a:r>
+            <a:endParaRPr lang="de-DE" sz="800" dirty="0"/>
+          </a:p>
+        </p:txBody>
+      </p:sp>
     </p:spTree>
     <p:extLst>
       <p:ext uri="{BB962C8B-B14F-4D97-AF65-F5344CB8AC3E}">

</xml_diff>